<commit_message>
added animation to com-part of Presentation.pptx
</commit_message>
<xml_diff>
--- a/Presentation/Presentation.pptx
+++ b/Presentation/Presentation.pptx
@@ -222,7 +222,7 @@
   <p:cmAuthor id="1" name="Thomas Schwarz" initials="TS" lastIdx="1" clrIdx="0">
     <p:extLst>
       <p:ext uri="{19B8F6BF-5375-455C-9EA6-DF929625EA0E}">
-        <p15:presenceInfo xmlns:p15="http://schemas.microsoft.com/office/powerpoint/2012/main" userId="953c7d0488bacd35" providerId="Windows Live"/>
+        <p15:presenceInfo xmlns:p15="http://schemas.microsoft.com/office/powerpoint/2012/main" xmlns="" userId="953c7d0488bacd35" providerId="Windows Live"/>
       </p:ext>
     </p:extLst>
   </p:cmAuthor>
@@ -236,7 +236,7 @@
     <p:text>Bracht es diese Folie, das selbe steht auf Folie 30</p:text>
     <p:extLst>
       <p:ext uri="{C676402C-5697-4E1C-873F-D02D1690AC5C}">
-        <p15:threadingInfo xmlns:p15="http://schemas.microsoft.com/office/powerpoint/2012/main" timeZoneBias="-60"/>
+        <p15:threadingInfo xmlns:p15="http://schemas.microsoft.com/office/powerpoint/2012/main" xmlns="" timeZoneBias="-60"/>
       </p:ext>
     </p:extLst>
   </p:cm>
@@ -484,7 +484,7 @@
           <a:p>
             <a:fld id="{C991D70F-D8B5-4D41-95B5-481C1B1D6FE8}" type="slidenum">
               <a:rPr lang="de-AT" smtClean="0"/>
-              <a:t>‹#›</a:t>
+              <a:t>‹Nr.›</a:t>
             </a:fld>
             <a:endParaRPr lang="de-AT"/>
           </a:p>
@@ -3168,7 +3168,7 @@
           <a:p>
             <a:fld id="{B0D0DE89-C507-497D-9025-51747C6C45ED}" type="slidenum">
               <a:rPr lang="de-AT" smtClean="0"/>
-              <a:t>‹#›</a:t>
+              <a:t>‹Nr.›</a:t>
             </a:fld>
             <a:endParaRPr lang="de-AT"/>
           </a:p>
@@ -3373,7 +3373,7 @@
           <a:p>
             <a:fld id="{B0D0DE89-C507-497D-9025-51747C6C45ED}" type="slidenum">
               <a:rPr lang="de-AT" smtClean="0"/>
-              <a:t>‹#›</a:t>
+              <a:t>‹Nr.›</a:t>
             </a:fld>
             <a:endParaRPr lang="de-AT"/>
           </a:p>
@@ -3553,7 +3553,7 @@
           <a:p>
             <a:fld id="{B0D0DE89-C507-497D-9025-51747C6C45ED}" type="slidenum">
               <a:rPr lang="de-AT" smtClean="0"/>
-              <a:t>‹#›</a:t>
+              <a:t>‹Nr.›</a:t>
             </a:fld>
             <a:endParaRPr lang="de-AT"/>
           </a:p>
@@ -3758,7 +3758,7 @@
           <a:p>
             <a:fld id="{B0D0DE89-C507-497D-9025-51747C6C45ED}" type="slidenum">
               <a:rPr lang="de-AT" smtClean="0"/>
-              <a:t>‹#›</a:t>
+              <a:t>‹Nr.›</a:t>
             </a:fld>
             <a:endParaRPr lang="de-AT"/>
           </a:p>
@@ -4086,7 +4086,7 @@
           <a:p>
             <a:fld id="{B0D0DE89-C507-497D-9025-51747C6C45ED}" type="slidenum">
               <a:rPr lang="de-AT" smtClean="0"/>
-              <a:t>‹#›</a:t>
+              <a:t>‹Nr.›</a:t>
             </a:fld>
             <a:endParaRPr lang="de-AT"/>
           </a:p>
@@ -4353,7 +4353,7 @@
           <a:p>
             <a:fld id="{B0D0DE89-C507-497D-9025-51747C6C45ED}" type="slidenum">
               <a:rPr lang="de-AT" smtClean="0"/>
-              <a:t>‹#›</a:t>
+              <a:t>‹Nr.›</a:t>
             </a:fld>
             <a:endParaRPr lang="de-AT"/>
           </a:p>
@@ -4729,7 +4729,7 @@
           <a:p>
             <a:fld id="{B0D0DE89-C507-497D-9025-51747C6C45ED}" type="slidenum">
               <a:rPr lang="de-AT" smtClean="0"/>
-              <a:t>‹#›</a:t>
+              <a:t>‹Nr.›</a:t>
             </a:fld>
             <a:endParaRPr lang="de-AT"/>
           </a:p>
@@ -4870,7 +4870,7 @@
           <a:p>
             <a:fld id="{B0D0DE89-C507-497D-9025-51747C6C45ED}" type="slidenum">
               <a:rPr lang="de-AT" smtClean="0"/>
-              <a:t>‹#›</a:t>
+              <a:t>‹Nr.›</a:t>
             </a:fld>
             <a:endParaRPr lang="de-AT"/>
           </a:p>
@@ -4965,7 +4965,7 @@
           <a:p>
             <a:fld id="{B0D0DE89-C507-497D-9025-51747C6C45ED}" type="slidenum">
               <a:rPr lang="de-AT" smtClean="0"/>
-              <a:t>‹#›</a:t>
+              <a:t>‹Nr.›</a:t>
             </a:fld>
             <a:endParaRPr lang="de-AT"/>
           </a:p>
@@ -5218,7 +5218,7 @@
           <a:p>
             <a:fld id="{B0D0DE89-C507-497D-9025-51747C6C45ED}" type="slidenum">
               <a:rPr lang="de-AT" smtClean="0"/>
-              <a:t>‹#›</a:t>
+              <a:t>‹Nr.›</a:t>
             </a:fld>
             <a:endParaRPr lang="de-AT"/>
           </a:p>
@@ -5542,7 +5542,7 @@
           <a:p>
             <a:fld id="{B0D0DE89-C507-497D-9025-51747C6C45ED}" type="slidenum">
               <a:rPr lang="de-AT" smtClean="0"/>
-              <a:t>‹#›</a:t>
+              <a:t>‹Nr.›</a:t>
             </a:fld>
             <a:endParaRPr lang="de-AT"/>
           </a:p>
@@ -5832,7 +5832,7 @@
           <a:p>
             <a:fld id="{B0D0DE89-C507-497D-9025-51747C6C45ED}" type="slidenum">
               <a:rPr lang="de-AT" smtClean="0"/>
-              <a:t>‹#›</a:t>
+              <a:t>‹Nr.›</a:t>
             </a:fld>
             <a:endParaRPr lang="de-AT"/>
           </a:p>
@@ -6426,11 +6426,7 @@
             </a:pPr>
             <a:r>
               <a:rPr lang="de-AT" dirty="0" smtClean="0"/>
-              <a:t>- Kein </a:t>
-            </a:r>
-            <a:r>
-              <a:rPr lang="de-AT" dirty="0" smtClean="0"/>
-              <a:t>einheitliches Interface für </a:t>
+              <a:t>- Kein einheitliches Interface für </a:t>
             </a:r>
             <a:r>
               <a:rPr lang="de-AT" dirty="0" err="1" smtClean="0"/>
@@ -6447,11 +6443,7 @@
             </a:pPr>
             <a:r>
               <a:rPr lang="de-AT" dirty="0" smtClean="0"/>
-              <a:t>- Sehr </a:t>
-            </a:r>
-            <a:r>
-              <a:rPr lang="de-AT" dirty="0" smtClean="0"/>
-              <a:t>viele Klassen und Schnittstellen </a:t>
+              <a:t>- Sehr viele Klassen und Schnittstellen </a:t>
             </a:r>
           </a:p>
           <a:p>
@@ -6468,11 +6460,7 @@
             </a:pPr>
             <a:r>
               <a:rPr lang="de-AT" dirty="0" smtClean="0"/>
-              <a:t>Aufwändige </a:t>
-            </a:r>
-            <a:r>
-              <a:rPr lang="de-AT" dirty="0" smtClean="0"/>
-              <a:t>und fehleranfällige </a:t>
+              <a:t>Aufwändige und fehleranfällige </a:t>
             </a:r>
             <a:r>
               <a:rPr lang="de-AT" dirty="0" err="1" smtClean="0"/>
@@ -6480,11 +6468,7 @@
             </a:r>
             <a:r>
               <a:rPr lang="de-AT" dirty="0" smtClean="0"/>
-              <a:t> Case Controller </a:t>
-            </a:r>
-            <a:r>
-              <a:rPr lang="de-AT" dirty="0" smtClean="0"/>
-              <a:t>Anpassungen</a:t>
+              <a:t> Case Controller Anpassungen</a:t>
             </a:r>
           </a:p>
           <a:p>
@@ -6518,6 +6502,13 @@
   <p:clrMapOvr>
     <a:masterClrMapping/>
   </p:clrMapOvr>
+  <p:timing>
+    <p:tnLst>
+      <p:par>
+        <p:cTn id="1" dur="indefinite" restart="never" nodeType="tmRoot"/>
+      </p:par>
+    </p:tnLst>
+  </p:timing>
 </p:sld>
 </file>
 
@@ -6555,7 +6546,7 @@
           <a:p>
             <a:r>
               <a:rPr lang="de-AT" dirty="0" smtClean="0"/>
-              <a:t>Fazit</a:t>
+              <a:t>Fazit - RMI</a:t>
             </a:r>
             <a:endParaRPr lang="en-GB" dirty="0"/>
           </a:p>
@@ -6661,6 +6652,13 @@
   <p:clrMapOvr>
     <a:masterClrMapping/>
   </p:clrMapOvr>
+  <p:timing>
+    <p:tnLst>
+      <p:par>
+        <p:cTn id="1" dur="indefinite" restart="never" nodeType="tmRoot"/>
+      </p:par>
+    </p:tnLst>
+  </p:timing>
 </p:sld>
 </file>
 
@@ -6729,7 +6727,6 @@
               <a:rPr lang="de-DE" dirty="0" smtClean="0"/>
               <a:t>Was ist EJB, Einsatz, Vor- und Nachteile, Umsetzung und Kritik</a:t>
             </a:r>
-            <a:endParaRPr lang="de-DE" dirty="0" smtClean="0"/>
           </a:p>
         </p:txBody>
       </p:sp>
@@ -6743,6 +6740,13 @@
   <p:clrMapOvr>
     <a:masterClrMapping/>
   </p:clrMapOvr>
+  <p:timing>
+    <p:tnLst>
+      <p:par>
+        <p:cTn id="1" dur="indefinite" restart="never" nodeType="tmRoot"/>
+      </p:par>
+    </p:tnLst>
+  </p:timing>
 </p:sld>
 </file>
 
@@ -7045,7 +7049,6 @@
               <a:rPr lang="de-DE" dirty="0" smtClean="0"/>
               <a:t>+ Spezifizierung</a:t>
             </a:r>
-            <a:endParaRPr lang="de-DE" dirty="0" smtClean="0"/>
           </a:p>
           <a:p>
             <a:pPr marL="0" indent="0">
@@ -7053,11 +7056,7 @@
             </a:pPr>
             <a:r>
               <a:rPr lang="de-DE" dirty="0" smtClean="0"/>
-              <a:t>+ Enge </a:t>
-            </a:r>
-            <a:r>
-              <a:rPr lang="de-DE" dirty="0" smtClean="0"/>
-              <a:t>Integration in J2EE</a:t>
+              <a:t>+ Enge Integration in J2EE</a:t>
             </a:r>
           </a:p>
           <a:p>
@@ -7068,7 +7067,6 @@
               <a:rPr lang="de-DE" dirty="0" smtClean="0"/>
               <a:t>+ Skalierbarkeit</a:t>
             </a:r>
-            <a:endParaRPr lang="de-DE" dirty="0" smtClean="0"/>
           </a:p>
           <a:p>
             <a:pPr marL="0" indent="0">
@@ -7512,13 +7510,8 @@
             </a:pPr>
             <a:r>
               <a:rPr lang="de-DE" dirty="0" smtClean="0"/>
-              <a:t>Entwicklung nicht </a:t>
-            </a:r>
-            <a:r>
-              <a:rPr lang="de-DE" dirty="0" smtClean="0"/>
-              <a:t>angenehm</a:t>
-            </a:r>
-            <a:endParaRPr lang="de-DE" dirty="0" smtClean="0"/>
+              <a:t>Entwicklung nicht angenehm</a:t>
+            </a:r>
           </a:p>
           <a:p>
             <a:endParaRPr lang="de-DE" dirty="0"/>
@@ -10388,11 +10381,7 @@
             </a:pPr>
             <a:r>
               <a:rPr lang="de-AT" dirty="0" smtClean="0"/>
-              <a:t>möglichst wenig </a:t>
-            </a:r>
-            <a:r>
-              <a:rPr lang="de-AT" dirty="0" smtClean="0"/>
-              <a:t>Logik</a:t>
+              <a:t>möglichst wenig Logik</a:t>
             </a:r>
           </a:p>
           <a:p>
@@ -10435,11 +10424,7 @@
             </a:pPr>
             <a:r>
               <a:rPr lang="de-AT" dirty="0" smtClean="0"/>
-              <a:t>-&gt; </a:t>
-            </a:r>
-            <a:r>
-              <a:rPr lang="de-AT" dirty="0" smtClean="0"/>
-              <a:t>vereinfacht Technologie Anpassung</a:t>
+              <a:t>-&gt; vereinfacht Technologie Anpassung</a:t>
             </a:r>
           </a:p>
           <a:p>
@@ -11017,7 +11002,6 @@
               <a:rPr lang="de-AT" sz="2000" dirty="0" smtClean="0"/>
               <a:t>Einladungen</a:t>
             </a:r>
-            <a:endParaRPr lang="de-AT" sz="2000" dirty="0" smtClean="0"/>
           </a:p>
           <a:p>
             <a:pPr>
@@ -11036,15 +11020,7 @@
             </a:pPr>
             <a:r>
               <a:rPr lang="de-AT" sz="1600" dirty="0" smtClean="0"/>
-              <a:t>Mitglied </a:t>
-            </a:r>
-            <a:r>
-              <a:rPr lang="de-AT" sz="1600" dirty="0" smtClean="0"/>
-              <a:t>suchen/ </a:t>
-            </a:r>
-            <a:r>
-              <a:rPr lang="de-AT" sz="1600" dirty="0" smtClean="0"/>
-              <a:t>ändern</a:t>
+              <a:t>Mitglied suchen/ ändern</a:t>
             </a:r>
           </a:p>
           <a:p>
@@ -11054,15 +11030,7 @@
             </a:pPr>
             <a:r>
               <a:rPr lang="de-AT" sz="1600" dirty="0" smtClean="0"/>
-              <a:t>Neues </a:t>
-            </a:r>
-            <a:r>
-              <a:rPr lang="de-AT" sz="1600" dirty="0" smtClean="0"/>
-              <a:t>Mitglied </a:t>
-            </a:r>
-            <a:r>
-              <a:rPr lang="de-AT" sz="1600" dirty="0" smtClean="0"/>
-              <a:t>anlegen</a:t>
+              <a:t>Neues Mitglied anlegen</a:t>
             </a:r>
           </a:p>
           <a:p>
@@ -11072,15 +11040,7 @@
             </a:pPr>
             <a:r>
               <a:rPr lang="de-AT" sz="1600" dirty="0" smtClean="0"/>
-              <a:t>Mitglied </a:t>
-            </a:r>
-            <a:r>
-              <a:rPr lang="de-AT" sz="1600" dirty="0" smtClean="0"/>
-              <a:t>zu einem Team </a:t>
-            </a:r>
-            <a:r>
-              <a:rPr lang="de-AT" sz="1600" dirty="0" smtClean="0"/>
-              <a:t>hinzufügen</a:t>
+              <a:t>Mitglied zu einem Team hinzufügen</a:t>
             </a:r>
             <a:endParaRPr lang="de-AT" sz="2000" dirty="0" smtClean="0"/>
           </a:p>
@@ -11101,15 +11061,7 @@
             </a:pPr>
             <a:r>
               <a:rPr lang="de-AT" sz="1600" dirty="0" smtClean="0"/>
-              <a:t>Neuen </a:t>
-            </a:r>
-            <a:r>
-              <a:rPr lang="de-AT" sz="1600" dirty="0" smtClean="0"/>
-              <a:t>Wettkampf </a:t>
-            </a:r>
-            <a:r>
-              <a:rPr lang="de-AT" sz="1600" dirty="0" smtClean="0"/>
-              <a:t>anlegen</a:t>
+              <a:t>Neuen Wettkampf anlegen</a:t>
             </a:r>
           </a:p>
           <a:p>
@@ -11119,15 +11071,7 @@
             </a:pPr>
             <a:r>
               <a:rPr lang="de-AT" sz="1600" dirty="0" smtClean="0"/>
-              <a:t>Wettkampf </a:t>
-            </a:r>
-            <a:r>
-              <a:rPr lang="de-AT" sz="1600" dirty="0" smtClean="0"/>
-              <a:t>Team </a:t>
-            </a:r>
-            <a:r>
-              <a:rPr lang="de-AT" sz="1600" dirty="0" smtClean="0"/>
-              <a:t>festlegen</a:t>
+              <a:t>Wettkampf Team festlegen</a:t>
             </a:r>
           </a:p>
           <a:p>
@@ -11147,11 +11091,7 @@
             </a:pPr>
             <a:r>
               <a:rPr lang="de-AT" sz="1600" dirty="0" smtClean="0"/>
-              <a:t>Wettkampf </a:t>
-            </a:r>
-            <a:r>
-              <a:rPr lang="de-AT" sz="1600" dirty="0" smtClean="0"/>
-              <a:t>Resultate eingeben</a:t>
+              <a:t>Wettkampf Resultate eingeben</a:t>
             </a:r>
           </a:p>
           <a:p>
@@ -11237,13 +11177,8 @@
             </a:pPr>
             <a:r>
               <a:rPr lang="de-AT" dirty="0" smtClean="0"/>
-              <a:t>Basis </a:t>
-            </a:r>
-            <a:r>
-              <a:rPr lang="de-AT" dirty="0" smtClean="0"/>
-              <a:t>Einstiegspunkt</a:t>
-            </a:r>
-            <a:endParaRPr lang="de-AT" dirty="0" smtClean="0"/>
+              <a:t>Basis Einstiegspunkt</a:t>
+            </a:r>
           </a:p>
           <a:p>
             <a:pPr>
@@ -11252,11 +11187,7 @@
             </a:pPr>
             <a:r>
               <a:rPr lang="de-AT" dirty="0" smtClean="0"/>
-              <a:t>Grob Navigation über </a:t>
-            </a:r>
-            <a:r>
-              <a:rPr lang="de-AT" dirty="0" smtClean="0"/>
-              <a:t>Tabs</a:t>
+              <a:t>Grob Navigation über Tabs</a:t>
             </a:r>
           </a:p>
           <a:p>
@@ -11279,7 +11210,6 @@
               <a:rPr lang="de-AT" dirty="0" smtClean="0"/>
               <a:t>Übersichtlichkeit</a:t>
             </a:r>
-            <a:endParaRPr lang="de-AT" dirty="0" smtClean="0"/>
           </a:p>
           <a:p>
             <a:pPr>
@@ -11475,7 +11405,6 @@
               <a:rPr lang="de-AT" dirty="0" smtClean="0"/>
               <a:t>Login</a:t>
             </a:r>
-            <a:endParaRPr lang="de-AT" dirty="0" smtClean="0"/>
           </a:p>
           <a:p>
             <a:pPr marL="265176" lvl="1" indent="0">
@@ -11485,7 +11414,6 @@
               <a:rPr lang="de-AT" dirty="0" smtClean="0"/>
               <a:t>Berechtigungsprüfung</a:t>
             </a:r>
-            <a:endParaRPr lang="de-AT" dirty="0" smtClean="0"/>
           </a:p>
           <a:p>
             <a:pPr lvl="1"/>
@@ -11693,7 +11621,6 @@
               <a:rPr lang="de-AT" dirty="0" smtClean="0"/>
               <a:t>Einladungen</a:t>
             </a:r>
-            <a:endParaRPr lang="de-AT" dirty="0" smtClean="0"/>
           </a:p>
           <a:p>
             <a:pPr>
@@ -11704,7 +11631,6 @@
               <a:rPr lang="de-AT" dirty="0" smtClean="0"/>
               <a:t>Webservice</a:t>
             </a:r>
-            <a:endParaRPr lang="de-AT" dirty="0" smtClean="0"/>
           </a:p>
           <a:p>
             <a:pPr>
@@ -11715,7 +11641,6 @@
               <a:rPr lang="de-AT" dirty="0" smtClean="0"/>
               <a:t>JMS</a:t>
             </a:r>
-            <a:endParaRPr lang="de-AT" dirty="0" smtClean="0"/>
           </a:p>
         </p:txBody>
       </p:sp>
@@ -11805,11 +11730,7 @@
             </a:r>
             <a:r>
               <a:rPr lang="de-AT" dirty="0" smtClean="0"/>
-              <a:t> </a:t>
-            </a:r>
-            <a:r>
-              <a:rPr lang="de-AT" dirty="0" smtClean="0"/>
-              <a:t>verbessert</a:t>
+              <a:t> verbessert</a:t>
             </a:r>
             <a:endParaRPr lang="de-AT" dirty="0"/>
           </a:p>
@@ -11830,11 +11751,7 @@
             </a:pPr>
             <a:r>
               <a:rPr lang="de-AT" dirty="0" smtClean="0"/>
-              <a:t>Fehler </a:t>
-            </a:r>
-            <a:r>
-              <a:rPr lang="de-AT" dirty="0" smtClean="0"/>
-              <a:t>in </a:t>
+              <a:t>Fehler in </a:t>
             </a:r>
             <a:r>
               <a:rPr lang="de-AT" dirty="0"/>
@@ -11842,13 +11759,8 @@
             </a:r>
             <a:r>
               <a:rPr lang="de-AT" dirty="0" smtClean="0"/>
-              <a:t>usammenhang mit div. </a:t>
-            </a:r>
-            <a:r>
-              <a:rPr lang="de-AT" dirty="0" smtClean="0"/>
-              <a:t>Schichten</a:t>
-            </a:r>
-            <a:endParaRPr lang="de-AT" dirty="0" smtClean="0"/>
+              <a:t>usammenhang mit div. Schichten</a:t>
+            </a:r>
           </a:p>
           <a:p>
             <a:pPr>
@@ -12028,11 +11940,7 @@
             </a:pPr>
             <a:r>
               <a:rPr lang="de-AT" dirty="0" smtClean="0"/>
-              <a:t>Technologien schließen sich gegenseitig </a:t>
-            </a:r>
-            <a:r>
-              <a:rPr lang="de-AT" dirty="0" smtClean="0"/>
-              <a:t>aus</a:t>
+              <a:t>Technologien schließen sich gegenseitig aus</a:t>
             </a:r>
           </a:p>
           <a:p>
@@ -12044,7 +11952,6 @@
               <a:rPr lang="de-AT" dirty="0" smtClean="0"/>
               <a:t>Genaue Analyse der Aufgabenstellung und abstecken was noch kommen kann</a:t>
             </a:r>
-            <a:endParaRPr lang="de-AT" dirty="0" smtClean="0"/>
           </a:p>
           <a:p>
             <a:pPr>
@@ -12053,13 +11960,8 @@
             </a:pPr>
             <a:r>
               <a:rPr lang="de-AT" dirty="0" smtClean="0"/>
-              <a:t>Zeitmanagement </a:t>
-            </a:r>
-            <a:r>
-              <a:rPr lang="de-AT" dirty="0" smtClean="0"/>
-              <a:t>essentiell</a:t>
-            </a:r>
-            <a:endParaRPr lang="de-AT" dirty="0" smtClean="0"/>
+              <a:t>Zeitmanagement essentiell</a:t>
+            </a:r>
           </a:p>
           <a:p>
             <a:pPr>
@@ -12338,6 +12240,13 @@
   <p:clrMapOvr>
     <a:masterClrMapping/>
   </p:clrMapOvr>
+  <p:timing>
+    <p:tnLst>
+      <p:par>
+        <p:cTn id="1" dur="indefinite" restart="never" nodeType="tmRoot"/>
+      </p:par>
+    </p:tnLst>
+  </p:timing>
 </p:sld>
 </file>
 
@@ -12407,8 +12316,8 @@
         </p:blipFill>
         <p:spPr>
           <a:xfrm>
-            <a:off x="3109383" y="2286000"/>
-            <a:ext cx="5363633" cy="4022725"/>
+            <a:off x="3076726" y="1662546"/>
+            <a:ext cx="6194906" cy="4646180"/>
           </a:xfrm>
         </p:spPr>
       </p:pic>
@@ -12420,8 +12329,8 @@
         </p:nvCxnSpPr>
         <p:spPr>
           <a:xfrm flipV="1">
-            <a:off x="4367808" y="2924944"/>
-            <a:ext cx="648072" cy="576064"/>
+            <a:off x="4858720" y="2924944"/>
+            <a:ext cx="157160" cy="684924"/>
           </a:xfrm>
           <a:prstGeom prst="straightConnector1">
             <a:avLst/>
@@ -12453,8 +12362,8 @@
         </p:nvCxnSpPr>
         <p:spPr>
           <a:xfrm flipV="1">
-            <a:off x="4439816" y="3501008"/>
-            <a:ext cx="0" cy="1656184"/>
+            <a:off x="4431645" y="3609868"/>
+            <a:ext cx="8171" cy="1756789"/>
           </a:xfrm>
           <a:prstGeom prst="straightConnector1">
             <a:avLst/>
@@ -12552,8 +12461,8 @@
         </p:nvSpPr>
         <p:spPr>
           <a:xfrm>
-            <a:off x="5087889" y="5229200"/>
-            <a:ext cx="45719" cy="576064"/>
+            <a:off x="5162763" y="5266052"/>
+            <a:ext cx="224340" cy="576064"/>
           </a:xfrm>
           <a:prstGeom prst="downArrow">
             <a:avLst/>
@@ -12592,7 +12501,7 @@
         </p:nvSpPr>
         <p:spPr>
           <a:xfrm>
-            <a:off x="3553644" y="5517232"/>
+            <a:off x="3700527" y="5701898"/>
             <a:ext cx="1462236" cy="369332"/>
           </a:xfrm>
           <a:prstGeom prst="rect">
@@ -12621,9 +12530,9 @@
           <p:nvPr/>
         </p:nvCxnSpPr>
         <p:spPr>
-          <a:xfrm flipV="1">
-            <a:off x="4583833" y="5013176"/>
-            <a:ext cx="549775" cy="576064"/>
+          <a:xfrm flipH="1" flipV="1">
+            <a:off x="6085114" y="5266052"/>
+            <a:ext cx="636098" cy="723878"/>
           </a:xfrm>
           <a:prstGeom prst="straightConnector1">
             <a:avLst/>
@@ -12657,6 +12566,309 @@
   <p:clrMapOvr>
     <a:masterClrMapping/>
   </p:clrMapOvr>
+  <p:timing>
+    <p:tnLst>
+      <p:par>
+        <p:cTn id="1" dur="indefinite" restart="never" nodeType="tmRoot">
+          <p:childTnLst>
+            <p:seq concurrent="1" nextAc="seek">
+              <p:cTn id="2" dur="indefinite" nodeType="mainSeq">
+                <p:childTnLst>
+                  <p:par>
+                    <p:cTn id="3" fill="hold">
+                      <p:stCondLst>
+                        <p:cond delay="indefinite"/>
+                      </p:stCondLst>
+                      <p:childTnLst>
+                        <p:par>
+                          <p:cTn id="4" fill="hold">
+                            <p:stCondLst>
+                              <p:cond delay="0"/>
+                            </p:stCondLst>
+                            <p:childTnLst>
+                              <p:par>
+                                <p:cTn id="5" presetID="1" presetClass="entr" presetSubtype="0" fill="hold" nodeType="clickEffect">
+                                  <p:stCondLst>
+                                    <p:cond delay="0"/>
+                                  </p:stCondLst>
+                                  <p:childTnLst>
+                                    <p:set>
+                                      <p:cBhvr>
+                                        <p:cTn id="6" dur="1" fill="hold">
+                                          <p:stCondLst>
+                                            <p:cond delay="0"/>
+                                          </p:stCondLst>
+                                        </p:cTn>
+                                        <p:tgtEl>
+                                          <p:spTgt spid="30"/>
+                                        </p:tgtEl>
+                                        <p:attrNameLst>
+                                          <p:attrName>style.visibility</p:attrName>
+                                        </p:attrNameLst>
+                                      </p:cBhvr>
+                                      <p:to>
+                                        <p:strVal val="visible"/>
+                                      </p:to>
+                                    </p:set>
+                                  </p:childTnLst>
+                                </p:cTn>
+                              </p:par>
+                            </p:childTnLst>
+                          </p:cTn>
+                        </p:par>
+                      </p:childTnLst>
+                    </p:cTn>
+                  </p:par>
+                  <p:par>
+                    <p:cTn id="7" fill="hold">
+                      <p:stCondLst>
+                        <p:cond delay="indefinite"/>
+                      </p:stCondLst>
+                      <p:childTnLst>
+                        <p:par>
+                          <p:cTn id="8" fill="hold">
+                            <p:stCondLst>
+                              <p:cond delay="0"/>
+                            </p:stCondLst>
+                            <p:childTnLst>
+                              <p:par>
+                                <p:cTn id="9" presetID="1" presetClass="entr" presetSubtype="0" fill="hold" grpId="0" nodeType="clickEffect">
+                                  <p:stCondLst>
+                                    <p:cond delay="0"/>
+                                  </p:stCondLst>
+                                  <p:childTnLst>
+                                    <p:set>
+                                      <p:cBhvr>
+                                        <p:cTn id="10" dur="1" fill="hold">
+                                          <p:stCondLst>
+                                            <p:cond delay="0"/>
+                                          </p:stCondLst>
+                                        </p:cTn>
+                                        <p:tgtEl>
+                                          <p:spTgt spid="25"/>
+                                        </p:tgtEl>
+                                        <p:attrNameLst>
+                                          <p:attrName>style.visibility</p:attrName>
+                                        </p:attrNameLst>
+                                      </p:cBhvr>
+                                      <p:to>
+                                        <p:strVal val="visible"/>
+                                      </p:to>
+                                    </p:set>
+                                  </p:childTnLst>
+                                </p:cTn>
+                              </p:par>
+                              <p:par>
+                                <p:cTn id="11" presetID="14" presetClass="entr" presetSubtype="10" fill="hold" grpId="0" nodeType="withEffect">
+                                  <p:stCondLst>
+                                    <p:cond delay="0"/>
+                                  </p:stCondLst>
+                                  <p:childTnLst>
+                                    <p:set>
+                                      <p:cBhvr>
+                                        <p:cTn id="12" dur="1" fill="hold">
+                                          <p:stCondLst>
+                                            <p:cond delay="0"/>
+                                          </p:stCondLst>
+                                        </p:cTn>
+                                        <p:tgtEl>
+                                          <p:spTgt spid="26"/>
+                                        </p:tgtEl>
+                                        <p:attrNameLst>
+                                          <p:attrName>style.visibility</p:attrName>
+                                        </p:attrNameLst>
+                                      </p:cBhvr>
+                                      <p:to>
+                                        <p:strVal val="visible"/>
+                                      </p:to>
+                                    </p:set>
+                                    <p:animEffect transition="in" filter="randombar(horizontal)">
+                                      <p:cBhvr>
+                                        <p:cTn id="13" dur="500"/>
+                                        <p:tgtEl>
+                                          <p:spTgt spid="26"/>
+                                        </p:tgtEl>
+                                      </p:cBhvr>
+                                    </p:animEffect>
+                                  </p:childTnLst>
+                                </p:cTn>
+                              </p:par>
+                            </p:childTnLst>
+                          </p:cTn>
+                        </p:par>
+                      </p:childTnLst>
+                    </p:cTn>
+                  </p:par>
+                  <p:par>
+                    <p:cTn id="14" fill="hold">
+                      <p:stCondLst>
+                        <p:cond delay="indefinite"/>
+                      </p:stCondLst>
+                      <p:childTnLst>
+                        <p:par>
+                          <p:cTn id="15" fill="hold">
+                            <p:stCondLst>
+                              <p:cond delay="0"/>
+                            </p:stCondLst>
+                            <p:childTnLst>
+                              <p:par>
+                                <p:cTn id="16" presetID="1" presetClass="entr" presetSubtype="0" fill="hold" nodeType="clickEffect">
+                                  <p:stCondLst>
+                                    <p:cond delay="0"/>
+                                  </p:stCondLst>
+                                  <p:childTnLst>
+                                    <p:set>
+                                      <p:cBhvr>
+                                        <p:cTn id="17" dur="1" fill="hold">
+                                          <p:stCondLst>
+                                            <p:cond delay="0"/>
+                                          </p:stCondLst>
+                                        </p:cTn>
+                                        <p:tgtEl>
+                                          <p:spTgt spid="20"/>
+                                        </p:tgtEl>
+                                        <p:attrNameLst>
+                                          <p:attrName>style.visibility</p:attrName>
+                                        </p:attrNameLst>
+                                      </p:cBhvr>
+                                      <p:to>
+                                        <p:strVal val="visible"/>
+                                      </p:to>
+                                    </p:set>
+                                  </p:childTnLst>
+                                </p:cTn>
+                              </p:par>
+                              <p:par>
+                                <p:cTn id="18" presetID="1" presetClass="entr" presetSubtype="0" fill="hold" nodeType="withEffect">
+                                  <p:stCondLst>
+                                    <p:cond delay="0"/>
+                                  </p:stCondLst>
+                                  <p:childTnLst>
+                                    <p:set>
+                                      <p:cBhvr>
+                                        <p:cTn id="19" dur="1" fill="hold">
+                                          <p:stCondLst>
+                                            <p:cond delay="0"/>
+                                          </p:stCondLst>
+                                        </p:cTn>
+                                        <p:tgtEl>
+                                          <p:spTgt spid="22"/>
+                                        </p:tgtEl>
+                                        <p:attrNameLst>
+                                          <p:attrName>style.visibility</p:attrName>
+                                        </p:attrNameLst>
+                                      </p:cBhvr>
+                                      <p:to>
+                                        <p:strVal val="visible"/>
+                                      </p:to>
+                                    </p:set>
+                                  </p:childTnLst>
+                                </p:cTn>
+                              </p:par>
+                              <p:par>
+                                <p:cTn id="20" presetID="1" presetClass="entr" presetSubtype="0" fill="hold" nodeType="withEffect">
+                                  <p:stCondLst>
+                                    <p:cond delay="0"/>
+                                  </p:stCondLst>
+                                  <p:childTnLst>
+                                    <p:set>
+                                      <p:cBhvr>
+                                        <p:cTn id="21" dur="1" fill="hold">
+                                          <p:stCondLst>
+                                            <p:cond delay="0"/>
+                                          </p:stCondLst>
+                                        </p:cTn>
+                                        <p:tgtEl>
+                                          <p:spTgt spid="24"/>
+                                        </p:tgtEl>
+                                        <p:attrNameLst>
+                                          <p:attrName>style.visibility</p:attrName>
+                                        </p:attrNameLst>
+                                      </p:cBhvr>
+                                      <p:to>
+                                        <p:strVal val="visible"/>
+                                      </p:to>
+                                    </p:set>
+                                  </p:childTnLst>
+                                </p:cTn>
+                              </p:par>
+                            </p:childTnLst>
+                          </p:cTn>
+                        </p:par>
+                      </p:childTnLst>
+                    </p:cTn>
+                  </p:par>
+                  <p:par>
+                    <p:cTn id="22" fill="hold">
+                      <p:stCondLst>
+                        <p:cond delay="indefinite"/>
+                      </p:stCondLst>
+                      <p:childTnLst>
+                        <p:par>
+                          <p:cTn id="23" fill="hold">
+                            <p:stCondLst>
+                              <p:cond delay="0"/>
+                            </p:stCondLst>
+                            <p:childTnLst>
+                              <p:par>
+                                <p:cTn id="24" presetID="1" presetClass="entr" presetSubtype="0" fill="hold" nodeType="clickEffect">
+                                  <p:stCondLst>
+                                    <p:cond delay="0"/>
+                                  </p:stCondLst>
+                                  <p:childTnLst>
+                                    <p:set>
+                                      <p:cBhvr>
+                                        <p:cTn id="25" dur="1" fill="hold">
+                                          <p:stCondLst>
+                                            <p:cond delay="0"/>
+                                          </p:stCondLst>
+                                        </p:cTn>
+                                        <p:tgtEl>
+                                          <p:spTgt spid="6"/>
+                                        </p:tgtEl>
+                                        <p:attrNameLst>
+                                          <p:attrName>style.visibility</p:attrName>
+                                        </p:attrNameLst>
+                                      </p:cBhvr>
+                                      <p:to>
+                                        <p:strVal val="visible"/>
+                                      </p:to>
+                                    </p:set>
+                                  </p:childTnLst>
+                                </p:cTn>
+                              </p:par>
+                            </p:childTnLst>
+                          </p:cTn>
+                        </p:par>
+                      </p:childTnLst>
+                    </p:cTn>
+                  </p:par>
+                </p:childTnLst>
+              </p:cTn>
+              <p:prevCondLst>
+                <p:cond evt="onPrev" delay="0">
+                  <p:tgtEl>
+                    <p:sldTgt/>
+                  </p:tgtEl>
+                </p:cond>
+              </p:prevCondLst>
+              <p:nextCondLst>
+                <p:cond evt="onNext" delay="0">
+                  <p:tgtEl>
+                    <p:sldTgt/>
+                  </p:tgtEl>
+                </p:cond>
+              </p:nextCondLst>
+            </p:seq>
+          </p:childTnLst>
+        </p:cTn>
+      </p:par>
+    </p:tnLst>
+    <p:bldLst>
+      <p:bldP spid="25" grpId="0" animBg="1"/>
+      <p:bldP spid="26" grpId="0"/>
+    </p:bldLst>
+  </p:timing>
 </p:sld>
 </file>
 
@@ -12740,11 +12952,7 @@
             </a:pPr>
             <a:r>
               <a:rPr lang="en-GB" sz="1600" dirty="0"/>
-              <a:t>     public </a:t>
-            </a:r>
-            <a:r>
-              <a:rPr lang="en-GB" sz="1600" dirty="0"/>
-              <a:t>static void main(String[] </a:t>
+              <a:t>     public static void main(String[] </a:t>
             </a:r>
             <a:r>
               <a:rPr lang="en-GB" sz="1600" dirty="0" err="1"/>
@@ -12879,6 +13087,13 @@
   <p:clrMapOvr>
     <a:masterClrMapping/>
   </p:clrMapOvr>
+  <p:timing>
+    <p:tnLst>
+      <p:par>
+        <p:cTn id="1" dur="indefinite" restart="never" nodeType="tmRoot"/>
+      </p:par>
+    </p:tnLst>
+  </p:timing>
 </p:sld>
 </file>
 
@@ -12956,11 +13171,7 @@
             </a:r>
             <a:r>
               <a:rPr lang="en-GB" sz="2000" dirty="0"/>
-              <a:t> </a:t>
-            </a:r>
-            <a:r>
-              <a:rPr lang="en-GB" sz="2000" dirty="0"/>
-              <a:t>= new </a:t>
+              <a:t> = new </a:t>
             </a:r>
             <a:r>
               <a:rPr lang="en-GB" sz="2000" dirty="0" err="1"/>
@@ -13283,39 +13494,6 @@
           </a:p>
         </p:txBody>
       </p:sp>
-      <p:cxnSp>
-        <p:nvCxnSpPr>
-          <p:cNvPr id="12" name="Gerade Verbindung mit Pfeil 11"/>
-          <p:cNvCxnSpPr/>
-          <p:nvPr/>
-        </p:nvCxnSpPr>
-        <p:spPr>
-          <a:xfrm flipH="1">
-            <a:off x="3387436" y="4078710"/>
-            <a:ext cx="4073238" cy="1331674"/>
-          </a:xfrm>
-          <a:prstGeom prst="straightConnector1">
-            <a:avLst/>
-          </a:prstGeom>
-          <a:ln>
-            <a:tailEnd type="arrow"/>
-          </a:ln>
-        </p:spPr>
-        <p:style>
-          <a:lnRef idx="1">
-            <a:schemeClr val="accent1"/>
-          </a:lnRef>
-          <a:fillRef idx="0">
-            <a:schemeClr val="accent1"/>
-          </a:fillRef>
-          <a:effectRef idx="0">
-            <a:schemeClr val="accent1"/>
-          </a:effectRef>
-          <a:fontRef idx="minor">
-            <a:schemeClr val="tx1"/>
-          </a:fontRef>
-        </p:style>
-      </p:cxnSp>
       <p:cxnSp>
         <p:nvCxnSpPr>
           <p:cNvPr id="14" name="Gerade Verbindung mit Pfeil 13"/>
@@ -13359,6 +13537,507 @@
   <p:clrMapOvr>
     <a:masterClrMapping/>
   </p:clrMapOvr>
+  <p:timing>
+    <p:tnLst>
+      <p:par>
+        <p:cTn id="1" dur="indefinite" restart="never" nodeType="tmRoot">
+          <p:childTnLst>
+            <p:seq concurrent="1" nextAc="seek">
+              <p:cTn id="2" dur="indefinite" nodeType="mainSeq">
+                <p:childTnLst>
+                  <p:par>
+                    <p:cTn id="3" fill="hold">
+                      <p:stCondLst>
+                        <p:cond delay="indefinite"/>
+                      </p:stCondLst>
+                      <p:childTnLst>
+                        <p:par>
+                          <p:cTn id="4" fill="hold">
+                            <p:stCondLst>
+                              <p:cond delay="0"/>
+                            </p:stCondLst>
+                            <p:childTnLst>
+                              <p:par>
+                                <p:cTn id="5" presetID="1" presetClass="entr" presetSubtype="0" fill="hold" grpId="0" nodeType="clickEffect">
+                                  <p:stCondLst>
+                                    <p:cond delay="0"/>
+                                  </p:stCondLst>
+                                  <p:childTnLst>
+                                    <p:set>
+                                      <p:cBhvr>
+                                        <p:cTn id="6" dur="1" fill="hold">
+                                          <p:stCondLst>
+                                            <p:cond delay="0"/>
+                                          </p:stCondLst>
+                                        </p:cTn>
+                                        <p:tgtEl>
+                                          <p:spTgt spid="5"/>
+                                        </p:tgtEl>
+                                        <p:attrNameLst>
+                                          <p:attrName>style.visibility</p:attrName>
+                                        </p:attrNameLst>
+                                      </p:cBhvr>
+                                      <p:to>
+                                        <p:strVal val="visible"/>
+                                      </p:to>
+                                    </p:set>
+                                  </p:childTnLst>
+                                </p:cTn>
+                              </p:par>
+                              <p:par>
+                                <p:cTn id="7" presetID="1" presetClass="entr" presetSubtype="0" fill="hold" grpId="0" nodeType="withEffect">
+                                  <p:stCondLst>
+                                    <p:cond delay="0"/>
+                                  </p:stCondLst>
+                                  <p:childTnLst>
+                                    <p:set>
+                                      <p:cBhvr>
+                                        <p:cTn id="8" dur="1" fill="hold">
+                                          <p:stCondLst>
+                                            <p:cond delay="0"/>
+                                          </p:stCondLst>
+                                        </p:cTn>
+                                        <p:tgtEl>
+                                          <p:spTgt spid="6"/>
+                                        </p:tgtEl>
+                                        <p:attrNameLst>
+                                          <p:attrName>style.visibility</p:attrName>
+                                        </p:attrNameLst>
+                                      </p:cBhvr>
+                                      <p:to>
+                                        <p:strVal val="visible"/>
+                                      </p:to>
+                                    </p:set>
+                                  </p:childTnLst>
+                                </p:cTn>
+                              </p:par>
+                            </p:childTnLst>
+                          </p:cTn>
+                        </p:par>
+                      </p:childTnLst>
+                    </p:cTn>
+                  </p:par>
+                  <p:par>
+                    <p:cTn id="9" fill="hold">
+                      <p:stCondLst>
+                        <p:cond delay="indefinite"/>
+                      </p:stCondLst>
+                      <p:childTnLst>
+                        <p:par>
+                          <p:cTn id="10" fill="hold">
+                            <p:stCondLst>
+                              <p:cond delay="0"/>
+                            </p:stCondLst>
+                            <p:childTnLst>
+                              <p:par>
+                                <p:cTn id="11" presetID="1" presetClass="entr" presetSubtype="0" fill="hold" grpId="0" nodeType="clickEffect">
+                                  <p:stCondLst>
+                                    <p:cond delay="0"/>
+                                  </p:stCondLst>
+                                  <p:childTnLst>
+                                    <p:set>
+                                      <p:cBhvr>
+                                        <p:cTn id="12" dur="1" fill="hold">
+                                          <p:stCondLst>
+                                            <p:cond delay="0"/>
+                                          </p:stCondLst>
+                                        </p:cTn>
+                                        <p:tgtEl>
+                                          <p:spTgt spid="7"/>
+                                        </p:tgtEl>
+                                        <p:attrNameLst>
+                                          <p:attrName>style.visibility</p:attrName>
+                                        </p:attrNameLst>
+                                      </p:cBhvr>
+                                      <p:to>
+                                        <p:strVal val="visible"/>
+                                      </p:to>
+                                    </p:set>
+                                  </p:childTnLst>
+                                </p:cTn>
+                              </p:par>
+                              <p:par>
+                                <p:cTn id="13" presetID="1" presetClass="entr" presetSubtype="0" fill="hold" grpId="0" nodeType="withEffect">
+                                  <p:stCondLst>
+                                    <p:cond delay="0"/>
+                                  </p:stCondLst>
+                                  <p:childTnLst>
+                                    <p:set>
+                                      <p:cBhvr>
+                                        <p:cTn id="14" dur="1" fill="hold">
+                                          <p:stCondLst>
+                                            <p:cond delay="0"/>
+                                          </p:stCondLst>
+                                        </p:cTn>
+                                        <p:tgtEl>
+                                          <p:spTgt spid="8"/>
+                                        </p:tgtEl>
+                                        <p:attrNameLst>
+                                          <p:attrName>style.visibility</p:attrName>
+                                        </p:attrNameLst>
+                                      </p:cBhvr>
+                                      <p:to>
+                                        <p:strVal val="visible"/>
+                                      </p:to>
+                                    </p:set>
+                                  </p:childTnLst>
+                                </p:cTn>
+                              </p:par>
+                            </p:childTnLst>
+                          </p:cTn>
+                        </p:par>
+                      </p:childTnLst>
+                    </p:cTn>
+                  </p:par>
+                  <p:par>
+                    <p:cTn id="15" fill="hold">
+                      <p:stCondLst>
+                        <p:cond delay="indefinite"/>
+                      </p:stCondLst>
+                      <p:childTnLst>
+                        <p:par>
+                          <p:cTn id="16" fill="hold">
+                            <p:stCondLst>
+                              <p:cond delay="0"/>
+                            </p:stCondLst>
+                            <p:childTnLst>
+                              <p:par>
+                                <p:cTn id="17" presetID="14" presetClass="entr" presetSubtype="10" fill="hold" nodeType="clickEffect">
+                                  <p:stCondLst>
+                                    <p:cond delay="0"/>
+                                  </p:stCondLst>
+                                  <p:childTnLst>
+                                    <p:set>
+                                      <p:cBhvr>
+                                        <p:cTn id="18" dur="1" fill="hold">
+                                          <p:stCondLst>
+                                            <p:cond delay="0"/>
+                                          </p:stCondLst>
+                                        </p:cTn>
+                                        <p:tgtEl>
+                                          <p:spTgt spid="3">
+                                            <p:txEl>
+                                              <p:pRg st="3" end="3"/>
+                                            </p:txEl>
+                                          </p:spTgt>
+                                        </p:tgtEl>
+                                        <p:attrNameLst>
+                                          <p:attrName>style.visibility</p:attrName>
+                                        </p:attrNameLst>
+                                      </p:cBhvr>
+                                      <p:to>
+                                        <p:strVal val="visible"/>
+                                      </p:to>
+                                    </p:set>
+                                    <p:animEffect transition="in" filter="randombar(horizontal)">
+                                      <p:cBhvr>
+                                        <p:cTn id="19" dur="500"/>
+                                        <p:tgtEl>
+                                          <p:spTgt spid="3">
+                                            <p:txEl>
+                                              <p:pRg st="3" end="3"/>
+                                            </p:txEl>
+                                          </p:spTgt>
+                                        </p:tgtEl>
+                                      </p:cBhvr>
+                                    </p:animEffect>
+                                  </p:childTnLst>
+                                </p:cTn>
+                              </p:par>
+                              <p:par>
+                                <p:cTn id="20" presetID="14" presetClass="entr" presetSubtype="10" fill="hold" nodeType="withEffect">
+                                  <p:stCondLst>
+                                    <p:cond delay="0"/>
+                                  </p:stCondLst>
+                                  <p:childTnLst>
+                                    <p:set>
+                                      <p:cBhvr>
+                                        <p:cTn id="21" dur="1" fill="hold">
+                                          <p:stCondLst>
+                                            <p:cond delay="0"/>
+                                          </p:stCondLst>
+                                        </p:cTn>
+                                        <p:tgtEl>
+                                          <p:spTgt spid="3">
+                                            <p:txEl>
+                                              <p:pRg st="4" end="4"/>
+                                            </p:txEl>
+                                          </p:spTgt>
+                                        </p:tgtEl>
+                                        <p:attrNameLst>
+                                          <p:attrName>style.visibility</p:attrName>
+                                        </p:attrNameLst>
+                                      </p:cBhvr>
+                                      <p:to>
+                                        <p:strVal val="visible"/>
+                                      </p:to>
+                                    </p:set>
+                                    <p:animEffect transition="in" filter="randombar(horizontal)">
+                                      <p:cBhvr>
+                                        <p:cTn id="22" dur="500"/>
+                                        <p:tgtEl>
+                                          <p:spTgt spid="3">
+                                            <p:txEl>
+                                              <p:pRg st="4" end="4"/>
+                                            </p:txEl>
+                                          </p:spTgt>
+                                        </p:tgtEl>
+                                      </p:cBhvr>
+                                    </p:animEffect>
+                                  </p:childTnLst>
+                                </p:cTn>
+                              </p:par>
+                              <p:par>
+                                <p:cTn id="23" presetID="14" presetClass="entr" presetSubtype="10" fill="hold" nodeType="withEffect">
+                                  <p:stCondLst>
+                                    <p:cond delay="0"/>
+                                  </p:stCondLst>
+                                  <p:childTnLst>
+                                    <p:set>
+                                      <p:cBhvr>
+                                        <p:cTn id="24" dur="1" fill="hold">
+                                          <p:stCondLst>
+                                            <p:cond delay="0"/>
+                                          </p:stCondLst>
+                                        </p:cTn>
+                                        <p:tgtEl>
+                                          <p:spTgt spid="3">
+                                            <p:txEl>
+                                              <p:pRg st="5" end="5"/>
+                                            </p:txEl>
+                                          </p:spTgt>
+                                        </p:tgtEl>
+                                        <p:attrNameLst>
+                                          <p:attrName>style.visibility</p:attrName>
+                                        </p:attrNameLst>
+                                      </p:cBhvr>
+                                      <p:to>
+                                        <p:strVal val="visible"/>
+                                      </p:to>
+                                    </p:set>
+                                    <p:animEffect transition="in" filter="randombar(horizontal)">
+                                      <p:cBhvr>
+                                        <p:cTn id="25" dur="500"/>
+                                        <p:tgtEl>
+                                          <p:spTgt spid="3">
+                                            <p:txEl>
+                                              <p:pRg st="5" end="5"/>
+                                            </p:txEl>
+                                          </p:spTgt>
+                                        </p:tgtEl>
+                                      </p:cBhvr>
+                                    </p:animEffect>
+                                  </p:childTnLst>
+                                </p:cTn>
+                              </p:par>
+                              <p:par>
+                                <p:cTn id="26" presetID="14" presetClass="entr" presetSubtype="10" fill="hold" nodeType="withEffect">
+                                  <p:stCondLst>
+                                    <p:cond delay="0"/>
+                                  </p:stCondLst>
+                                  <p:childTnLst>
+                                    <p:set>
+                                      <p:cBhvr>
+                                        <p:cTn id="27" dur="1" fill="hold">
+                                          <p:stCondLst>
+                                            <p:cond delay="0"/>
+                                          </p:stCondLst>
+                                        </p:cTn>
+                                        <p:tgtEl>
+                                          <p:spTgt spid="3">
+                                            <p:txEl>
+                                              <p:pRg st="6" end="6"/>
+                                            </p:txEl>
+                                          </p:spTgt>
+                                        </p:tgtEl>
+                                        <p:attrNameLst>
+                                          <p:attrName>style.visibility</p:attrName>
+                                        </p:attrNameLst>
+                                      </p:cBhvr>
+                                      <p:to>
+                                        <p:strVal val="visible"/>
+                                      </p:to>
+                                    </p:set>
+                                    <p:animEffect transition="in" filter="randombar(horizontal)">
+                                      <p:cBhvr>
+                                        <p:cTn id="28" dur="500"/>
+                                        <p:tgtEl>
+                                          <p:spTgt spid="3">
+                                            <p:txEl>
+                                              <p:pRg st="6" end="6"/>
+                                            </p:txEl>
+                                          </p:spTgt>
+                                        </p:tgtEl>
+                                      </p:cBhvr>
+                                    </p:animEffect>
+                                  </p:childTnLst>
+                                </p:cTn>
+                              </p:par>
+                              <p:par>
+                                <p:cTn id="29" presetID="14" presetClass="entr" presetSubtype="10" fill="hold" nodeType="withEffect">
+                                  <p:stCondLst>
+                                    <p:cond delay="0"/>
+                                  </p:stCondLst>
+                                  <p:childTnLst>
+                                    <p:set>
+                                      <p:cBhvr>
+                                        <p:cTn id="30" dur="1" fill="hold">
+                                          <p:stCondLst>
+                                            <p:cond delay="0"/>
+                                          </p:stCondLst>
+                                        </p:cTn>
+                                        <p:tgtEl>
+                                          <p:spTgt spid="3">
+                                            <p:txEl>
+                                              <p:pRg st="7" end="7"/>
+                                            </p:txEl>
+                                          </p:spTgt>
+                                        </p:tgtEl>
+                                        <p:attrNameLst>
+                                          <p:attrName>style.visibility</p:attrName>
+                                        </p:attrNameLst>
+                                      </p:cBhvr>
+                                      <p:to>
+                                        <p:strVal val="visible"/>
+                                      </p:to>
+                                    </p:set>
+                                    <p:animEffect transition="in" filter="randombar(horizontal)">
+                                      <p:cBhvr>
+                                        <p:cTn id="31" dur="500"/>
+                                        <p:tgtEl>
+                                          <p:spTgt spid="3">
+                                            <p:txEl>
+                                              <p:pRg st="7" end="7"/>
+                                            </p:txEl>
+                                          </p:spTgt>
+                                        </p:tgtEl>
+                                      </p:cBhvr>
+                                    </p:animEffect>
+                                  </p:childTnLst>
+                                </p:cTn>
+                              </p:par>
+                              <p:par>
+                                <p:cTn id="32" presetID="14" presetClass="entr" presetSubtype="10" fill="hold" nodeType="withEffect">
+                                  <p:stCondLst>
+                                    <p:cond delay="0"/>
+                                  </p:stCondLst>
+                                  <p:childTnLst>
+                                    <p:set>
+                                      <p:cBhvr>
+                                        <p:cTn id="33" dur="1" fill="hold">
+                                          <p:stCondLst>
+                                            <p:cond delay="0"/>
+                                          </p:stCondLst>
+                                        </p:cTn>
+                                        <p:tgtEl>
+                                          <p:spTgt spid="3">
+                                            <p:txEl>
+                                              <p:pRg st="8" end="8"/>
+                                            </p:txEl>
+                                          </p:spTgt>
+                                        </p:tgtEl>
+                                        <p:attrNameLst>
+                                          <p:attrName>style.visibility</p:attrName>
+                                        </p:attrNameLst>
+                                      </p:cBhvr>
+                                      <p:to>
+                                        <p:strVal val="visible"/>
+                                      </p:to>
+                                    </p:set>
+                                    <p:animEffect transition="in" filter="randombar(horizontal)">
+                                      <p:cBhvr>
+                                        <p:cTn id="34" dur="500"/>
+                                        <p:tgtEl>
+                                          <p:spTgt spid="3">
+                                            <p:txEl>
+                                              <p:pRg st="8" end="8"/>
+                                            </p:txEl>
+                                          </p:spTgt>
+                                        </p:tgtEl>
+                                      </p:cBhvr>
+                                    </p:animEffect>
+                                  </p:childTnLst>
+                                </p:cTn>
+                              </p:par>
+                            </p:childTnLst>
+                          </p:cTn>
+                        </p:par>
+                      </p:childTnLst>
+                    </p:cTn>
+                  </p:par>
+                  <p:par>
+                    <p:cTn id="35" fill="hold">
+                      <p:stCondLst>
+                        <p:cond delay="indefinite"/>
+                      </p:stCondLst>
+                      <p:childTnLst>
+                        <p:par>
+                          <p:cTn id="36" fill="hold">
+                            <p:stCondLst>
+                              <p:cond delay="0"/>
+                            </p:stCondLst>
+                            <p:childTnLst>
+                              <p:par>
+                                <p:cTn id="37" presetID="1" presetClass="entr" presetSubtype="0" fill="hold" nodeType="clickEffect">
+                                  <p:stCondLst>
+                                    <p:cond delay="0"/>
+                                  </p:stCondLst>
+                                  <p:childTnLst>
+                                    <p:set>
+                                      <p:cBhvr>
+                                        <p:cTn id="38" dur="1" fill="hold">
+                                          <p:stCondLst>
+                                            <p:cond delay="0"/>
+                                          </p:stCondLst>
+                                        </p:cTn>
+                                        <p:tgtEl>
+                                          <p:spTgt spid="14"/>
+                                        </p:tgtEl>
+                                        <p:attrNameLst>
+                                          <p:attrName>style.visibility</p:attrName>
+                                        </p:attrNameLst>
+                                      </p:cBhvr>
+                                      <p:to>
+                                        <p:strVal val="visible"/>
+                                      </p:to>
+                                    </p:set>
+                                  </p:childTnLst>
+                                </p:cTn>
+                              </p:par>
+                            </p:childTnLst>
+                          </p:cTn>
+                        </p:par>
+                      </p:childTnLst>
+                    </p:cTn>
+                  </p:par>
+                </p:childTnLst>
+              </p:cTn>
+              <p:prevCondLst>
+                <p:cond evt="onPrev" delay="0">
+                  <p:tgtEl>
+                    <p:sldTgt/>
+                  </p:tgtEl>
+                </p:cond>
+              </p:prevCondLst>
+              <p:nextCondLst>
+                <p:cond evt="onNext" delay="0">
+                  <p:tgtEl>
+                    <p:sldTgt/>
+                  </p:tgtEl>
+                </p:cond>
+              </p:nextCondLst>
+            </p:seq>
+          </p:childTnLst>
+        </p:cTn>
+      </p:par>
+    </p:tnLst>
+    <p:bldLst>
+      <p:bldP spid="5" grpId="0" animBg="1"/>
+      <p:bldP spid="6" grpId="0"/>
+      <p:bldP spid="7" grpId="0" animBg="1"/>
+      <p:bldP spid="8" grpId="0"/>
+    </p:bldLst>
+  </p:timing>
 </p:sld>
 </file>
 
@@ -13685,6 +14364,184 @@
   <p:clrMapOvr>
     <a:masterClrMapping/>
   </p:clrMapOvr>
+  <p:timing>
+    <p:tnLst>
+      <p:par>
+        <p:cTn id="1" dur="indefinite" restart="never" nodeType="tmRoot">
+          <p:childTnLst>
+            <p:seq concurrent="1" nextAc="seek">
+              <p:cTn id="2" dur="indefinite" nodeType="mainSeq">
+                <p:childTnLst>
+                  <p:par>
+                    <p:cTn id="3" fill="hold">
+                      <p:stCondLst>
+                        <p:cond delay="indefinite"/>
+                      </p:stCondLst>
+                      <p:childTnLst>
+                        <p:par>
+                          <p:cTn id="4" fill="hold">
+                            <p:stCondLst>
+                              <p:cond delay="0"/>
+                            </p:stCondLst>
+                            <p:childTnLst>
+                              <p:par>
+                                <p:cTn id="5" presetID="1" presetClass="entr" presetSubtype="0" fill="hold" nodeType="clickEffect">
+                                  <p:stCondLst>
+                                    <p:cond delay="0"/>
+                                  </p:stCondLst>
+                                  <p:childTnLst>
+                                    <p:set>
+                                      <p:cBhvr>
+                                        <p:cTn id="6" dur="1" fill="hold">
+                                          <p:stCondLst>
+                                            <p:cond delay="0"/>
+                                          </p:stCondLst>
+                                        </p:cTn>
+                                        <p:tgtEl>
+                                          <p:spTgt spid="10"/>
+                                        </p:tgtEl>
+                                        <p:attrNameLst>
+                                          <p:attrName>style.visibility</p:attrName>
+                                        </p:attrNameLst>
+                                      </p:cBhvr>
+                                      <p:to>
+                                        <p:strVal val="visible"/>
+                                      </p:to>
+                                    </p:set>
+                                  </p:childTnLst>
+                                </p:cTn>
+                              </p:par>
+                              <p:par>
+                                <p:cTn id="7" presetID="1" presetClass="entr" presetSubtype="0" fill="hold" grpId="0" nodeType="withEffect">
+                                  <p:stCondLst>
+                                    <p:cond delay="0"/>
+                                  </p:stCondLst>
+                                  <p:childTnLst>
+                                    <p:set>
+                                      <p:cBhvr>
+                                        <p:cTn id="8" dur="1" fill="hold">
+                                          <p:stCondLst>
+                                            <p:cond delay="0"/>
+                                          </p:stCondLst>
+                                        </p:cTn>
+                                        <p:tgtEl>
+                                          <p:spTgt spid="11"/>
+                                        </p:tgtEl>
+                                        <p:attrNameLst>
+                                          <p:attrName>style.visibility</p:attrName>
+                                        </p:attrNameLst>
+                                      </p:cBhvr>
+                                      <p:to>
+                                        <p:strVal val="visible"/>
+                                      </p:to>
+                                    </p:set>
+                                  </p:childTnLst>
+                                </p:cTn>
+                              </p:par>
+                            </p:childTnLst>
+                          </p:cTn>
+                        </p:par>
+                      </p:childTnLst>
+                    </p:cTn>
+                  </p:par>
+                  <p:par>
+                    <p:cTn id="9" fill="hold">
+                      <p:stCondLst>
+                        <p:cond delay="indefinite"/>
+                      </p:stCondLst>
+                      <p:childTnLst>
+                        <p:par>
+                          <p:cTn id="10" fill="hold">
+                            <p:stCondLst>
+                              <p:cond delay="0"/>
+                            </p:stCondLst>
+                            <p:childTnLst>
+                              <p:par>
+                                <p:cTn id="11" presetID="1" presetClass="entr" presetSubtype="0" fill="hold" nodeType="clickEffect">
+                                  <p:stCondLst>
+                                    <p:cond delay="0"/>
+                                  </p:stCondLst>
+                                  <p:childTnLst>
+                                    <p:set>
+                                      <p:cBhvr>
+                                        <p:cTn id="12" dur="1" fill="hold">
+                                          <p:stCondLst>
+                                            <p:cond delay="0"/>
+                                          </p:stCondLst>
+                                        </p:cTn>
+                                        <p:tgtEl>
+                                          <p:spTgt spid="7"/>
+                                        </p:tgtEl>
+                                        <p:attrNameLst>
+                                          <p:attrName>style.visibility</p:attrName>
+                                        </p:attrNameLst>
+                                      </p:cBhvr>
+                                      <p:to>
+                                        <p:strVal val="visible"/>
+                                      </p:to>
+                                    </p:set>
+                                  </p:childTnLst>
+                                </p:cTn>
+                              </p:par>
+                              <p:par>
+                                <p:cTn id="13" presetID="1" presetClass="entr" presetSubtype="0" fill="hold" grpId="0" nodeType="withEffect">
+                                  <p:stCondLst>
+                                    <p:cond delay="0"/>
+                                  </p:stCondLst>
+                                  <p:childTnLst>
+                                    <p:set>
+                                      <p:cBhvr>
+                                        <p:cTn id="14" dur="1" fill="hold">
+                                          <p:stCondLst>
+                                            <p:cond delay="0"/>
+                                          </p:stCondLst>
+                                        </p:cTn>
+                                        <p:tgtEl>
+                                          <p:spTgt spid="8"/>
+                                        </p:tgtEl>
+                                        <p:attrNameLst>
+                                          <p:attrName>style.visibility</p:attrName>
+                                        </p:attrNameLst>
+                                      </p:cBhvr>
+                                      <p:to>
+                                        <p:strVal val="visible"/>
+                                      </p:to>
+                                    </p:set>
+                                  </p:childTnLst>
+                                </p:cTn>
+                              </p:par>
+                            </p:childTnLst>
+                          </p:cTn>
+                        </p:par>
+                      </p:childTnLst>
+                    </p:cTn>
+                  </p:par>
+                </p:childTnLst>
+              </p:cTn>
+              <p:prevCondLst>
+                <p:cond evt="onPrev" delay="0">
+                  <p:tgtEl>
+                    <p:sldTgt/>
+                  </p:tgtEl>
+                </p:cond>
+              </p:prevCondLst>
+              <p:nextCondLst>
+                <p:cond evt="onNext" delay="0">
+                  <p:tgtEl>
+                    <p:sldTgt/>
+                  </p:tgtEl>
+                </p:cond>
+              </p:nextCondLst>
+            </p:seq>
+          </p:childTnLst>
+        </p:cTn>
+      </p:par>
+    </p:tnLst>
+    <p:bldLst>
+      <p:bldP spid="8" grpId="0"/>
+      <p:bldP spid="11" grpId="0"/>
+    </p:bldLst>
+  </p:timing>
 </p:sld>
 </file>
 
@@ -13829,11 +14686,7 @@
             </a:r>
             <a:r>
               <a:rPr lang="en-GB" sz="2000" dirty="0" err="1"/>
-              <a:t>A</a:t>
-            </a:r>
-            <a:r>
-              <a:rPr lang="en-GB" sz="2000" dirty="0" err="1"/>
-              <a:t>ddMatchResultsServiceMapper</a:t>
+              <a:t>AddMatchResultsServiceMapper</a:t>
             </a:r>
             <a:r>
               <a:rPr lang="en-GB" sz="2000" dirty="0"/>
@@ -13844,49 +14697,19 @@
               <a:t>rmiServiceClient.getAddMatchResultsService</a:t>
             </a:r>
             <a:r>
-              <a:rPr lang="en-GB" sz="2000" dirty="0"/>
+              <a:rPr lang="en-GB" sz="2000" dirty="0" smtClean="0"/>
               <a:t>());</a:t>
             </a:r>
           </a:p>
-        </p:txBody>
-      </p:sp>
-      <p:sp>
-        <p:nvSpPr>
-          <p:cNvPr id="4" name="Pfeil nach oben 3"/>
-          <p:cNvSpPr/>
-          <p:nvPr/>
-        </p:nvSpPr>
-        <p:spPr>
-          <a:xfrm>
-            <a:off x="2855640" y="4005064"/>
-            <a:ext cx="792088" cy="1152128"/>
-          </a:xfrm>
-          <a:prstGeom prst="upArrow">
-            <a:avLst/>
-          </a:prstGeom>
-        </p:spPr>
-        <p:style>
-          <a:lnRef idx="2">
-            <a:schemeClr val="accent1">
-              <a:shade val="50000"/>
-            </a:schemeClr>
-          </a:lnRef>
-          <a:fillRef idx="1">
-            <a:schemeClr val="accent1"/>
-          </a:fillRef>
-          <a:effectRef idx="0">
-            <a:schemeClr val="accent1"/>
-          </a:effectRef>
-          <a:fontRef idx="minor">
-            <a:schemeClr val="lt1"/>
-          </a:fontRef>
-        </p:style>
-        <p:txBody>
-          <a:bodyPr rtlCol="0" anchor="ctr"/>
-          <a:lstStyle/>
-          <a:p>
-            <a:pPr algn="ctr"/>
-            <a:endParaRPr lang="en-GB"/>
+          <a:p>
+            <a:pPr marL="0" indent="0">
+              <a:buNone/>
+            </a:pPr>
+            <a:r>
+              <a:rPr lang="de-AT" sz="2000" dirty="0" smtClean="0"/>
+              <a:t>…</a:t>
+            </a:r>
+            <a:endParaRPr lang="en-GB" sz="2000" dirty="0"/>
           </a:p>
         </p:txBody>
       </p:sp>
@@ -13898,7 +14721,7 @@
         </p:nvSpPr>
         <p:spPr>
           <a:xfrm>
-            <a:off x="3863752" y="4581129"/>
+            <a:off x="6401814" y="3927986"/>
             <a:ext cx="5022144" cy="646331"/>
           </a:xfrm>
           <a:prstGeom prst="rect">
@@ -13934,6 +14757,39 @@
           </a:p>
         </p:txBody>
       </p:sp>
+      <p:cxnSp>
+        <p:nvCxnSpPr>
+          <p:cNvPr id="7" name="Gerade Verbindung mit Pfeil 6"/>
+          <p:cNvCxnSpPr/>
+          <p:nvPr/>
+        </p:nvCxnSpPr>
+        <p:spPr>
+          <a:xfrm flipH="1">
+            <a:off x="4234543" y="4251151"/>
+            <a:ext cx="2079171" cy="973992"/>
+          </a:xfrm>
+          <a:prstGeom prst="straightConnector1">
+            <a:avLst/>
+          </a:prstGeom>
+          <a:ln>
+            <a:tailEnd type="arrow"/>
+          </a:ln>
+        </p:spPr>
+        <p:style>
+          <a:lnRef idx="1">
+            <a:schemeClr val="accent1"/>
+          </a:lnRef>
+          <a:fillRef idx="0">
+            <a:schemeClr val="accent1"/>
+          </a:fillRef>
+          <a:effectRef idx="0">
+            <a:schemeClr val="accent1"/>
+          </a:effectRef>
+          <a:fontRef idx="minor">
+            <a:schemeClr val="tx1"/>
+          </a:fontRef>
+        </p:style>
+      </p:cxnSp>
     </p:spTree>
     <p:extLst>
       <p:ext uri="{BB962C8B-B14F-4D97-AF65-F5344CB8AC3E}">
@@ -13944,6 +14800,111 @@
   <p:clrMapOvr>
     <a:masterClrMapping/>
   </p:clrMapOvr>
+  <p:timing>
+    <p:tnLst>
+      <p:par>
+        <p:cTn id="1" dur="indefinite" restart="never" nodeType="tmRoot">
+          <p:childTnLst>
+            <p:seq concurrent="1" nextAc="seek">
+              <p:cTn id="2" dur="indefinite" nodeType="mainSeq">
+                <p:childTnLst>
+                  <p:par>
+                    <p:cTn id="3" fill="hold">
+                      <p:stCondLst>
+                        <p:cond delay="indefinite"/>
+                      </p:stCondLst>
+                      <p:childTnLst>
+                        <p:par>
+                          <p:cTn id="4" fill="hold">
+                            <p:stCondLst>
+                              <p:cond delay="0"/>
+                            </p:stCondLst>
+                            <p:childTnLst>
+                              <p:par>
+                                <p:cTn id="5" presetID="1" presetClass="entr" presetSubtype="0" fill="hold" nodeType="clickEffect">
+                                  <p:stCondLst>
+                                    <p:cond delay="0"/>
+                                  </p:stCondLst>
+                                  <p:childTnLst>
+                                    <p:set>
+                                      <p:cBhvr>
+                                        <p:cTn id="6" dur="1" fill="hold">
+                                          <p:stCondLst>
+                                            <p:cond delay="0"/>
+                                          </p:stCondLst>
+                                        </p:cTn>
+                                        <p:tgtEl>
+                                          <p:spTgt spid="7"/>
+                                        </p:tgtEl>
+                                        <p:attrNameLst>
+                                          <p:attrName>style.visibility</p:attrName>
+                                        </p:attrNameLst>
+                                      </p:cBhvr>
+                                      <p:to>
+                                        <p:strVal val="visible"/>
+                                      </p:to>
+                                    </p:set>
+                                  </p:childTnLst>
+                                </p:cTn>
+                              </p:par>
+                              <p:par>
+                                <p:cTn id="7" presetID="1" presetClass="entr" presetSubtype="0" fill="hold" grpId="0" nodeType="withEffect">
+                                  <p:stCondLst>
+                                    <p:cond delay="0"/>
+                                  </p:stCondLst>
+                                  <p:childTnLst>
+                                    <p:set>
+                                      <p:cBhvr>
+                                        <p:cTn id="8" dur="1" fill="hold">
+                                          <p:stCondLst>
+                                            <p:cond delay="0"/>
+                                          </p:stCondLst>
+                                        </p:cTn>
+                                        <p:tgtEl>
+                                          <p:spTgt spid="5"/>
+                                        </p:tgtEl>
+                                        <p:attrNameLst>
+                                          <p:attrName>style.visibility</p:attrName>
+                                        </p:attrNameLst>
+                                      </p:cBhvr>
+                                      <p:to>
+                                        <p:strVal val="visible"/>
+                                      </p:to>
+                                    </p:set>
+                                  </p:childTnLst>
+                                </p:cTn>
+                              </p:par>
+                            </p:childTnLst>
+                          </p:cTn>
+                        </p:par>
+                      </p:childTnLst>
+                    </p:cTn>
+                  </p:par>
+                </p:childTnLst>
+              </p:cTn>
+              <p:prevCondLst>
+                <p:cond evt="onPrev" delay="0">
+                  <p:tgtEl>
+                    <p:sldTgt/>
+                  </p:tgtEl>
+                </p:cond>
+              </p:prevCondLst>
+              <p:nextCondLst>
+                <p:cond evt="onNext" delay="0">
+                  <p:tgtEl>
+                    <p:sldTgt/>
+                  </p:tgtEl>
+                </p:cond>
+              </p:nextCondLst>
+            </p:seq>
+          </p:childTnLst>
+        </p:cTn>
+      </p:par>
+    </p:tnLst>
+    <p:bldLst>
+      <p:bldP spid="5" grpId="0"/>
+    </p:bldLst>
+  </p:timing>
 </p:sld>
 </file>
 
@@ -13990,12 +14951,12 @@
     </a:clrScheme>
     <a:fontScheme name="IntegralV7">
       <a:majorFont>
-        <a:latin typeface="Tw Cen MT Condensed" panose="020B0606020104020203"/>
+        <a:latin typeface="Tw Cen MT Condensed"/>
         <a:ea typeface=""/>
         <a:cs typeface=""/>
       </a:majorFont>
       <a:minorFont>
-        <a:latin typeface="Tw Cen MT" panose="020B0602020104020603"/>
+        <a:latin typeface="Tw Cen MT"/>
         <a:ea typeface=""/>
         <a:cs typeface=""/>
       </a:minorFont>
@@ -14145,7 +15106,7 @@
   <a:extraClrSchemeLst/>
   <a:extLst>
     <a:ext uri="{05A4C25C-085E-4340-85A3-A5531E510DB2}">
-      <thm15:themeFamily xmlns:thm15="http://schemas.microsoft.com/office/thememl/2012/main" name="Integral" id="{3577F8C9-A904-41D8-97D2-FD898F53F20E}" vid="{42448713-48CF-40FF-A256-E269CDCF5842}"/>
+      <thm15:themeFamily xmlns:thm15="http://schemas.microsoft.com/office/thememl/2012/main" xmlns="" name="Integral" id="{3577F8C9-A904-41D8-97D2-FD898F53F20E}" vid="{42448713-48CF-40FF-A256-E269CDCF5842}"/>
     </a:ext>
   </a:extLst>
 </a:theme>
@@ -14194,7 +15155,7 @@
     </a:clrScheme>
     <a:fontScheme name="Office">
       <a:majorFont>
-        <a:latin typeface="Calibri Light" panose="020F0302020204030204"/>
+        <a:latin typeface="Calibri Light"/>
         <a:ea typeface=""/>
         <a:cs typeface=""/>
         <a:font script="Jpan" typeface="ＭＳ ゴシック"/>
@@ -14229,7 +15190,7 @@
         <a:font script="Geor" typeface="Sylfaen"/>
       </a:majorFont>
       <a:minorFont>
-        <a:latin typeface="Calibri" panose="020F0502020204030204"/>
+        <a:latin typeface="Calibri"/>
         <a:ea typeface=""/>
         <a:cs typeface=""/>
         <a:font script="Jpan" typeface="ＭＳ ゴシック"/>
@@ -14406,7 +15367,7 @@
   <a:extraClrSchemeLst/>
   <a:extLst>
     <a:ext uri="{05A4C25C-085E-4340-85A3-A5531E510DB2}">
-      <thm15:themeFamily xmlns:thm15="http://schemas.microsoft.com/office/thememl/2012/main" name="Office Theme" id="{62F939B6-93AF-4DB8-9C6B-D6C7DFDC589F}" vid="{4A3C46E8-61CC-4603-A589-7422A47A8E4A}"/>
+      <thm15:themeFamily xmlns:thm15="http://schemas.microsoft.com/office/thememl/2012/main" xmlns="" name="Office Theme" id="{62F939B6-93AF-4DB8-9C6B-D6C7DFDC589F}" vid="{4A3C46E8-61CC-4603-A589-7422A47A8E4A}"/>
     </a:ext>
   </a:extLst>
 </a:theme>

</xml_diff>

<commit_message>
präse update -> picture manipuliert xD
</commit_message>
<xml_diff>
--- a/Presentation/Presentation.pptx
+++ b/Presentation/Presentation.pptx
@@ -11300,7 +11300,7 @@
           <a:bodyPr/>
           <a:lstStyle/>
           <a:p>
-            <a:endParaRPr lang="de-AT"/>
+            <a:endParaRPr lang="de-AT" dirty="0"/>
           </a:p>
         </p:txBody>
       </p:sp>
@@ -11326,6 +11326,47 @@
           <a:prstGeom prst="rect">
             <a:avLst/>
           </a:prstGeom>
+        </p:spPr>
+      </p:pic>
+      <p:pic>
+        <p:nvPicPr>
+          <p:cNvPr id="1026" name="Picture 2" descr="C:\Users\luc\Documents\GitHub\SportsClubManager\Client\src\presentation\logo.jpg"/>
+          <p:cNvPicPr>
+            <a:picLocks noChangeAspect="1" noChangeArrowheads="1"/>
+          </p:cNvPicPr>
+          <p:nvPr/>
+        </p:nvPicPr>
+        <p:blipFill>
+          <a:blip r:embed="rId4">
+            <a:extLst>
+              <a:ext uri="{28A0092B-C50C-407E-A947-70E740481C1C}">
+                <a14:useLocalDpi xmlns:a14="http://schemas.microsoft.com/office/drawing/2010/main" val="0"/>
+              </a:ext>
+            </a:extLst>
+          </a:blip>
+          <a:srcRect/>
+          <a:stretch>
+            <a:fillRect/>
+          </a:stretch>
+        </p:blipFill>
+        <p:spPr bwMode="auto">
+          <a:xfrm>
+            <a:off x="3647207" y="2743353"/>
+            <a:ext cx="4833215" cy="2389756"/>
+          </a:xfrm>
+          <a:prstGeom prst="rect">
+            <a:avLst/>
+          </a:prstGeom>
+          <a:noFill/>
+          <a:extLst>
+            <a:ext uri="{909E8E84-426E-40DD-AFC4-6F175D3DCCD1}">
+              <a14:hiddenFill xmlns:a14="http://schemas.microsoft.com/office/drawing/2010/main">
+                <a:solidFill>
+                  <a:srgbClr val="FFFFFF"/>
+                </a:solidFill>
+              </a14:hiddenFill>
+            </a:ext>
+          </a:extLst>
         </p:spPr>
       </p:pic>
     </p:spTree>
@@ -11769,8 +11810,33 @@
             </a:pPr>
             <a:r>
               <a:rPr lang="de-AT" dirty="0" smtClean="0"/>
-              <a:t>Wiederverwendbare Forms</a:t>
-            </a:r>
+              <a:t>Wiederverwendbare </a:t>
+            </a:r>
+            <a:r>
+              <a:rPr lang="de-AT" dirty="0" smtClean="0"/>
+              <a:t>Forms</a:t>
+            </a:r>
+          </a:p>
+          <a:p>
+            <a:pPr>
+              <a:buFont typeface="Arial" panose="020B0604020202020204" pitchFamily="34" charset="0"/>
+              <a:buChar char="•"/>
+            </a:pPr>
+            <a:r>
+              <a:rPr lang="de-AT" dirty="0" smtClean="0"/>
+              <a:t>Unit Tests</a:t>
+            </a:r>
+          </a:p>
+          <a:p>
+            <a:pPr>
+              <a:buFont typeface="Arial" panose="020B0604020202020204" pitchFamily="34" charset="0"/>
+              <a:buChar char="•"/>
+            </a:pPr>
+            <a:r>
+              <a:rPr lang="de-AT" smtClean="0"/>
+              <a:t>Datenbank Testapplikation</a:t>
+            </a:r>
+            <a:endParaRPr lang="de-AT"/>
           </a:p>
         </p:txBody>
       </p:sp>

</xml_diff>

<commit_message>
presentation gui, lessons learned
</commit_message>
<xml_diff>
--- a/Presentation/Presentation.pptx
+++ b/Presentation/Presentation.pptx
@@ -5,7 +5,7 @@
     <p:sldMasterId id="2147483720" r:id="rId1"/>
   </p:sldMasterIdLst>
   <p:notesMasterIdLst>
-    <p:notesMasterId r:id="rId48"/>
+    <p:notesMasterId r:id="rId50"/>
   </p:notesMasterIdLst>
   <p:sldIdLst>
     <p:sldId id="256" r:id="rId2"/>
@@ -48,12 +48,14 @@
     <p:sldId id="264" r:id="rId39"/>
     <p:sldId id="265" r:id="rId40"/>
     <p:sldId id="307" r:id="rId41"/>
-    <p:sldId id="266" r:id="rId42"/>
-    <p:sldId id="267" r:id="rId43"/>
-    <p:sldId id="298" r:id="rId44"/>
-    <p:sldId id="268" r:id="rId45"/>
-    <p:sldId id="269" r:id="rId46"/>
-    <p:sldId id="299" r:id="rId47"/>
+    <p:sldId id="309" r:id="rId42"/>
+    <p:sldId id="310" r:id="rId43"/>
+    <p:sldId id="266" r:id="rId44"/>
+    <p:sldId id="267" r:id="rId45"/>
+    <p:sldId id="298" r:id="rId46"/>
+    <p:sldId id="268" r:id="rId47"/>
+    <p:sldId id="269" r:id="rId48"/>
+    <p:sldId id="299" r:id="rId49"/>
   </p:sldIdLst>
   <p:sldSz cx="12192000" cy="6858000"/>
   <p:notesSz cx="6858000" cy="9144000"/>
@@ -217,6 +219,8 @@
             <p14:sldId id="264"/>
             <p14:sldId id="265"/>
             <p14:sldId id="307"/>
+            <p14:sldId id="309"/>
+            <p14:sldId id="310"/>
             <p14:sldId id="266"/>
             <p14:sldId id="267"/>
           </p14:sldIdLst>
@@ -1294,7 +1298,7 @@
             </a:r>
             <a:r>
               <a:rPr lang="de-AT" baseline="0" dirty="0" smtClean="0"/>
-              <a:t> dar welche in Java realisiert wurde und  u.a. die Wettkampfergebnisse ausgibt</a:t>
+              <a:t> dar welche in Java realisiert wurde und  u.a. die Wettkampfergebnisse ausgibt, eigenes Projekt -&gt; eig. Nichts mit dem zu tun</a:t>
             </a:r>
           </a:p>
           <a:p>
@@ -1336,7 +1340,31 @@
             </a:pPr>
             <a:r>
               <a:rPr lang="de-AT" baseline="0" dirty="0" smtClean="0"/>
-              <a:t>Eine vom abgekoppelte JMS Umsetzung</a:t>
+              <a:t>Eine vom abgekoppelte JMS Umsetzung -&gt; </a:t>
+            </a:r>
+            <a:r>
+              <a:rPr lang="de-AT" baseline="0" dirty="0" err="1" smtClean="0"/>
+              <a:t>einbindung</a:t>
+            </a:r>
+            <a:r>
+              <a:rPr lang="de-AT" baseline="0" dirty="0" smtClean="0"/>
+              <a:t> nicht </a:t>
+            </a:r>
+            <a:r>
+              <a:rPr lang="de-AT" baseline="0" dirty="0" err="1" smtClean="0"/>
+              <a:t>möglcih</a:t>
+            </a:r>
+            <a:r>
+              <a:rPr lang="de-AT" baseline="0" dirty="0" smtClean="0"/>
+              <a:t> -&gt; </a:t>
+            </a:r>
+            <a:r>
+              <a:rPr lang="de-AT" baseline="0" dirty="0" err="1" smtClean="0"/>
+              <a:t>probleme</a:t>
+            </a:r>
+            <a:r>
+              <a:rPr lang="de-AT" baseline="0" dirty="0" smtClean="0"/>
+              <a:t> gegenseitig blockiert</a:t>
             </a:r>
           </a:p>
           <a:p>
@@ -1365,7 +1393,7 @@
           <a:p>
             <a:fld id="{5E424E5C-960A-40AF-91BF-B49DEF3D51D8}" type="slidenum">
               <a:rPr lang="de-AT" smtClean="0"/>
-              <a:t>41</a:t>
+              <a:t>43</a:t>
             </a:fld>
             <a:endParaRPr lang="de-AT"/>
           </a:p>
@@ -1549,7 +1577,7 @@
           <a:p>
             <a:fld id="{5E424E5C-960A-40AF-91BF-B49DEF3D51D8}" type="slidenum">
               <a:rPr lang="de-AT" smtClean="0"/>
-              <a:t>42</a:t>
+              <a:t>44</a:t>
             </a:fld>
             <a:endParaRPr lang="de-AT"/>
           </a:p>
@@ -1631,6 +1659,50 @@
             </a:pPr>
             <a:r>
               <a:rPr lang="de-AT" dirty="0" smtClean="0"/>
+              <a:t>Analyse + Aufteilung</a:t>
+            </a:r>
+            <a:r>
+              <a:rPr lang="de-AT" baseline="0" dirty="0" smtClean="0"/>
+              <a:t> </a:t>
+            </a:r>
+            <a:r>
+              <a:rPr lang="de-AT" dirty="0" smtClean="0"/>
+              <a:t>Aufgabenstellung -&gt;</a:t>
+            </a:r>
+            <a:r>
+              <a:rPr lang="de-AT" baseline="0" dirty="0" smtClean="0"/>
+              <a:t> </a:t>
+            </a:r>
+            <a:r>
+              <a:rPr lang="de-AT" baseline="0" dirty="0" err="1" smtClean="0"/>
+              <a:t>gemeinsammer</a:t>
+            </a:r>
+            <a:r>
+              <a:rPr lang="de-AT" baseline="0" dirty="0" smtClean="0"/>
+              <a:t> Wissenstand</a:t>
+            </a:r>
+            <a:endParaRPr lang="de-AT" dirty="0" smtClean="0"/>
+          </a:p>
+          <a:p>
+            <a:pPr marL="0" marR="0" indent="0" algn="l" defTabSz="914400" rtl="0" eaLnBrk="1" fontAlgn="auto" latinLnBrk="0" hangingPunct="1">
+              <a:lnSpc>
+                <a:spcPct val="100000"/>
+              </a:lnSpc>
+              <a:spcBef>
+                <a:spcPts val="0"/>
+              </a:spcBef>
+              <a:spcAft>
+                <a:spcPts val="0"/>
+              </a:spcAft>
+              <a:buClrTx/>
+              <a:buSzTx/>
+              <a:buFontTx/>
+              <a:buNone/>
+              <a:tabLst/>
+              <a:defRPr/>
+            </a:pPr>
+            <a:r>
+              <a:rPr lang="de-AT" dirty="0" smtClean="0"/>
               <a:t>Zeitmanagement</a:t>
             </a:r>
             <a:r>
@@ -1661,7 +1733,7 @@
           <a:p>
             <a:fld id="{C991D70F-D8B5-4D41-95B5-481C1B1D6FE8}" type="slidenum">
               <a:rPr lang="de-AT" smtClean="0"/>
-              <a:t>44</a:t>
+              <a:t>46</a:t>
             </a:fld>
             <a:endParaRPr lang="de-AT"/>
           </a:p>
@@ -2834,32 +2906,6 @@
         <p:txBody>
           <a:bodyPr/>
           <a:lstStyle/>
-          <a:p>
-            <a:r>
-              <a:rPr lang="de-AT" dirty="0" smtClean="0"/>
-              <a:t>TODO: Screenshot</a:t>
-            </a:r>
-            <a:r>
-              <a:rPr lang="de-AT" baseline="0" dirty="0" smtClean="0"/>
-              <a:t> </a:t>
-            </a:r>
-            <a:r>
-              <a:rPr lang="de-AT" baseline="0" dirty="0" err="1" smtClean="0"/>
-              <a:t>evt</a:t>
-            </a:r>
-            <a:r>
-              <a:rPr lang="de-AT" baseline="0" dirty="0" smtClean="0"/>
-              <a:t>. Noch ändern (kein leeres </a:t>
-            </a:r>
-            <a:r>
-              <a:rPr lang="de-AT" baseline="0" dirty="0" err="1" smtClean="0"/>
-              <a:t>feld</a:t>
-            </a:r>
-            <a:r>
-              <a:rPr lang="de-AT" baseline="0" dirty="0" smtClean="0"/>
-              <a:t>)</a:t>
-            </a:r>
-          </a:p>
           <a:p>
             <a:endParaRPr lang="de-AT" baseline="0" dirty="0" smtClean="0"/>
           </a:p>
@@ -11377,7 +11423,7 @@
             </a:pPr>
             <a:r>
               <a:rPr lang="de-AT" dirty="0" smtClean="0"/>
-              <a:t>-&gt; </a:t>
+              <a:t> </a:t>
             </a:r>
             <a:r>
               <a:rPr lang="de-AT" dirty="0" err="1" smtClean="0"/>
@@ -11410,7 +11456,7 @@
             </a:pPr>
             <a:r>
               <a:rPr lang="de-AT" dirty="0" smtClean="0"/>
-              <a:t>-&gt; vereinfacht Technologie Anpassung</a:t>
+              <a:t>vereinfacht Technologie Anpassung</a:t>
             </a:r>
           </a:p>
           <a:p>
@@ -12294,7 +12340,7 @@
           <a:p>
             <a:r>
               <a:rPr lang="de-AT" dirty="0" smtClean="0"/>
-              <a:t>Beispiel: Mitglied Suchen/Ändern</a:t>
+              <a:t>Mitglied Suchen/Ändern</a:t>
             </a:r>
             <a:endParaRPr lang="de-AT" dirty="0"/>
           </a:p>
@@ -12302,7 +12348,7 @@
       </p:sp>
       <p:pic>
         <p:nvPicPr>
-          <p:cNvPr id="1026" name="Picture 2" descr="C:\Users\luc\Pictures\09.01.13 14_51-Bildschirmkopie.png"/>
+          <p:cNvPr id="2060" name="Picture 12" descr="C:\Users\luc\Desktop\SearchChange.png"/>
           <p:cNvPicPr>
             <a:picLocks noGrp="1" noChangeAspect="1" noChangeArrowheads="1"/>
           </p:cNvPicPr>
@@ -12325,8 +12371,8 @@
         </p:blipFill>
         <p:spPr bwMode="auto">
           <a:xfrm>
-            <a:off x="2467514" y="1892300"/>
-            <a:ext cx="7297942" cy="4416425"/>
+            <a:off x="2416287" y="1835347"/>
+            <a:ext cx="7005505" cy="4750647"/>
           </a:xfrm>
           <a:prstGeom prst="rect">
             <a:avLst/>
@@ -12397,7 +12443,7 @@
           <a:p>
             <a:r>
               <a:rPr lang="de-AT" dirty="0" smtClean="0"/>
-              <a:t>Erweiterungen</a:t>
+              <a:t>Observer Solution</a:t>
             </a:r>
             <a:endParaRPr lang="de-AT" dirty="0"/>
           </a:p>
@@ -12413,75 +12459,620 @@
             <p:ph idx="1"/>
           </p:nvPr>
         </p:nvSpPr>
-        <p:spPr/>
+        <p:spPr>
+          <a:xfrm>
+            <a:off x="838202" y="1944547"/>
+            <a:ext cx="10528137" cy="4734045"/>
+          </a:xfrm>
+        </p:spPr>
+        <p:txBody>
+          <a:bodyPr>
+            <a:noAutofit/>
+          </a:bodyPr>
+          <a:lstStyle/>
+          <a:p>
+            <a:pPr marL="0" indent="0">
+              <a:buNone/>
+            </a:pPr>
+            <a:r>
+              <a:rPr lang="en-US" sz="1400" dirty="0"/>
+              <a:t>public class </a:t>
+            </a:r>
+            <a:r>
+              <a:rPr lang="en-US" sz="1400" dirty="0" err="1" smtClean="0"/>
+              <a:t>MembershipDataPanel</a:t>
+            </a:r>
+            <a:r>
+              <a:rPr lang="en-US" sz="1400" dirty="0" smtClean="0"/>
+              <a:t>  </a:t>
+            </a:r>
+            <a:r>
+              <a:rPr lang="en-US" sz="1400" dirty="0"/>
+              <a:t>extends </a:t>
+            </a:r>
+            <a:r>
+              <a:rPr lang="en-US" sz="1400" dirty="0" err="1" smtClean="0"/>
+              <a:t>JPanel</a:t>
+            </a:r>
+            <a:r>
+              <a:rPr lang="en-US" sz="1400" dirty="0" smtClean="0"/>
+              <a:t>  implements </a:t>
+            </a:r>
+            <a:r>
+              <a:rPr lang="en-US" sz="1400" dirty="0" err="1"/>
+              <a:t>SelectedSportsValue</a:t>
+            </a:r>
+            <a:r>
+              <a:rPr lang="en-US" sz="1400" dirty="0"/>
+              <a:t>, </a:t>
+            </a:r>
+            <a:r>
+              <a:rPr lang="en-US" sz="1400" dirty="0" err="1"/>
+              <a:t>SelectedPlayerTeamsValue</a:t>
+            </a:r>
+            <a:r>
+              <a:rPr lang="en-US" sz="1400" dirty="0"/>
+              <a:t>, </a:t>
+            </a:r>
+            <a:r>
+              <a:rPr lang="en-US" sz="1400" dirty="0" err="1"/>
+              <a:t>SelectTrainerTeamsValue</a:t>
+            </a:r>
+            <a:r>
+              <a:rPr lang="en-US" sz="1400" dirty="0"/>
+              <a:t> </a:t>
+            </a:r>
+            <a:r>
+              <a:rPr lang="en-US" sz="1400" dirty="0" smtClean="0"/>
+              <a:t>{</a:t>
+            </a:r>
+          </a:p>
+          <a:p>
+            <a:pPr marL="0" indent="0">
+              <a:buNone/>
+            </a:pPr>
+            <a:r>
+              <a:rPr lang="en-US" sz="1400" dirty="0" smtClean="0"/>
+              <a:t>	private </a:t>
+            </a:r>
+            <a:r>
+              <a:rPr lang="en-US" sz="1400" dirty="0"/>
+              <a:t>void </a:t>
+            </a:r>
+            <a:r>
+              <a:rPr lang="en-US" sz="1400" dirty="0" err="1" smtClean="0"/>
+              <a:t>btnAddSportActionPerformed</a:t>
+            </a:r>
+            <a:r>
+              <a:rPr lang="en-US" sz="1400" dirty="0" smtClean="0"/>
+              <a:t>(</a:t>
+            </a:r>
+            <a:r>
+              <a:rPr lang="en-US" sz="1400" dirty="0" err="1" smtClean="0"/>
+              <a:t>ActionEvent</a:t>
+            </a:r>
+            <a:r>
+              <a:rPr lang="en-US" sz="1400" dirty="0" smtClean="0"/>
+              <a:t> </a:t>
+            </a:r>
+            <a:r>
+              <a:rPr lang="en-US" sz="1400" dirty="0" err="1"/>
+              <a:t>evt</a:t>
+            </a:r>
+            <a:r>
+              <a:rPr lang="en-US" sz="1400" dirty="0"/>
+              <a:t>) </a:t>
+            </a:r>
+            <a:r>
+              <a:rPr lang="en-US" sz="1400" dirty="0" smtClean="0"/>
+              <a:t>{</a:t>
+            </a:r>
+          </a:p>
+          <a:p>
+            <a:pPr marL="0" indent="0">
+              <a:buNone/>
+            </a:pPr>
+            <a:r>
+              <a:rPr lang="en-US" sz="1400" dirty="0"/>
+              <a:t>	</a:t>
+            </a:r>
+            <a:r>
+              <a:rPr lang="en-US" sz="1400" dirty="0" smtClean="0"/>
+              <a:t>	</a:t>
+            </a:r>
+            <a:r>
+              <a:rPr lang="en-US" sz="1400" dirty="0" err="1" smtClean="0"/>
+              <a:t>SelectSportsHelper</a:t>
+            </a:r>
+            <a:r>
+              <a:rPr lang="en-US" sz="1400" dirty="0" smtClean="0"/>
+              <a:t> helper = </a:t>
+            </a:r>
+            <a:r>
+              <a:rPr lang="en-US" sz="1400" dirty="0"/>
+              <a:t>new </a:t>
+            </a:r>
+            <a:r>
+              <a:rPr lang="en-US" sz="1400" dirty="0" err="1" smtClean="0"/>
+              <a:t>SelectSportsHelper</a:t>
+            </a:r>
+            <a:r>
+              <a:rPr lang="en-US" sz="1400" dirty="0" smtClean="0"/>
+              <a:t>(</a:t>
+            </a:r>
+            <a:r>
+              <a:rPr lang="en-US" sz="1400" dirty="0" err="1" smtClean="0"/>
+              <a:t>controller.getAllSports</a:t>
+            </a:r>
+            <a:r>
+              <a:rPr lang="en-US" sz="1400" dirty="0"/>
+              <a:t>(), </a:t>
+            </a:r>
+            <a:r>
+              <a:rPr lang="en-US" sz="1400" dirty="0" err="1"/>
+              <a:t>selectedSports</a:t>
+            </a:r>
+            <a:r>
+              <a:rPr lang="en-US" sz="1400" dirty="0"/>
+              <a:t>, this</a:t>
+            </a:r>
+            <a:r>
+              <a:rPr lang="en-US" sz="1400" dirty="0" smtClean="0"/>
+              <a:t>);       </a:t>
+            </a:r>
+          </a:p>
+          <a:p>
+            <a:pPr marL="0" indent="0">
+              <a:lnSpc>
+                <a:spcPct val="100000"/>
+              </a:lnSpc>
+              <a:spcBef>
+                <a:spcPts val="0"/>
+              </a:spcBef>
+              <a:spcAft>
+                <a:spcPts val="0"/>
+              </a:spcAft>
+              <a:buNone/>
+            </a:pPr>
+            <a:r>
+              <a:rPr lang="en-US" sz="1400" dirty="0" smtClean="0"/>
+              <a:t>	}</a:t>
+            </a:r>
+          </a:p>
+          <a:p>
+            <a:pPr marL="0" indent="0">
+              <a:lnSpc>
+                <a:spcPct val="100000"/>
+              </a:lnSpc>
+              <a:spcBef>
+                <a:spcPts val="0"/>
+              </a:spcBef>
+              <a:spcAft>
+                <a:spcPts val="0"/>
+              </a:spcAft>
+              <a:buNone/>
+            </a:pPr>
+            <a:r>
+              <a:rPr lang="en-US" sz="1400" dirty="0"/>
+              <a:t>}</a:t>
+            </a:r>
+          </a:p>
+          <a:p>
+            <a:pPr marL="0" indent="0">
+              <a:buNone/>
+            </a:pPr>
+            <a:r>
+              <a:rPr lang="en-US" sz="1400" dirty="0" smtClean="0"/>
+              <a:t>public </a:t>
+            </a:r>
+            <a:r>
+              <a:rPr lang="en-US" sz="1400" dirty="0"/>
+              <a:t>class </a:t>
+            </a:r>
+            <a:r>
+              <a:rPr lang="en-US" sz="1400" dirty="0" err="1" smtClean="0"/>
+              <a:t>SelectSportsHelper</a:t>
+            </a:r>
+            <a:r>
+              <a:rPr lang="en-US" sz="1400" dirty="0" smtClean="0"/>
+              <a:t> {</a:t>
+            </a:r>
+          </a:p>
+          <a:p>
+            <a:pPr marL="0" indent="0">
+              <a:buNone/>
+            </a:pPr>
+            <a:r>
+              <a:rPr lang="en-US" sz="1400" dirty="0"/>
+              <a:t>	</a:t>
+            </a:r>
+            <a:r>
+              <a:rPr lang="en-US" sz="1400" dirty="0" smtClean="0"/>
+              <a:t>private void </a:t>
+            </a:r>
+            <a:r>
+              <a:rPr lang="en-US" sz="1400" dirty="0" err="1" smtClean="0"/>
+              <a:t>btnAddSports</a:t>
+            </a:r>
+            <a:r>
+              <a:rPr lang="en-US" sz="1400" dirty="0" smtClean="0"/>
+              <a:t>(</a:t>
+            </a:r>
+            <a:r>
+              <a:rPr lang="en-US" sz="1400" dirty="0" err="1" smtClean="0"/>
+              <a:t>ActionEvent</a:t>
+            </a:r>
+            <a:r>
+              <a:rPr lang="en-US" sz="1400" dirty="0" smtClean="0"/>
+              <a:t> </a:t>
+            </a:r>
+            <a:r>
+              <a:rPr lang="en-US" sz="1400" dirty="0" err="1" smtClean="0"/>
+              <a:t>evt</a:t>
+            </a:r>
+            <a:r>
+              <a:rPr lang="en-US" sz="1400" dirty="0" smtClean="0"/>
+              <a:t>){…</a:t>
+            </a:r>
+          </a:p>
+          <a:p>
+            <a:pPr marL="0" lvl="1" indent="0">
+              <a:spcBef>
+                <a:spcPts val="1200"/>
+              </a:spcBef>
+              <a:spcAft>
+                <a:spcPts val="200"/>
+              </a:spcAft>
+              <a:buClrTx/>
+              <a:buNone/>
+            </a:pPr>
+            <a:r>
+              <a:rPr lang="de-AT" sz="1400" dirty="0" smtClean="0"/>
+              <a:t>		</a:t>
+            </a:r>
+            <a:r>
+              <a:rPr lang="de-AT" sz="1400" dirty="0" err="1" smtClean="0"/>
+              <a:t>selectedSportsValue.sportSelected</a:t>
+            </a:r>
+            <a:r>
+              <a:rPr lang="de-AT" sz="1400" dirty="0" smtClean="0"/>
+              <a:t>(</a:t>
+            </a:r>
+            <a:r>
+              <a:rPr lang="de-AT" sz="1400" dirty="0" err="1" smtClean="0"/>
+              <a:t>selSports</a:t>
+            </a:r>
+            <a:r>
+              <a:rPr lang="de-AT" sz="1400" dirty="0" smtClean="0"/>
+              <a:t>);</a:t>
+            </a:r>
+            <a:endParaRPr lang="en-US" sz="1400" dirty="0" smtClean="0"/>
+          </a:p>
+          <a:p>
+            <a:pPr marL="0" indent="0">
+              <a:lnSpc>
+                <a:spcPct val="100000"/>
+              </a:lnSpc>
+              <a:spcBef>
+                <a:spcPts val="0"/>
+              </a:spcBef>
+              <a:spcAft>
+                <a:spcPts val="0"/>
+              </a:spcAft>
+              <a:buNone/>
+            </a:pPr>
+            <a:r>
+              <a:rPr lang="en-US" sz="1400" dirty="0" smtClean="0"/>
+              <a:t>	}</a:t>
+            </a:r>
+            <a:endParaRPr lang="de-AT" sz="1400" dirty="0" smtClean="0"/>
+          </a:p>
+          <a:p>
+            <a:pPr marL="0" indent="0">
+              <a:lnSpc>
+                <a:spcPct val="100000"/>
+              </a:lnSpc>
+              <a:spcBef>
+                <a:spcPts val="0"/>
+              </a:spcBef>
+              <a:spcAft>
+                <a:spcPts val="0"/>
+              </a:spcAft>
+              <a:buNone/>
+            </a:pPr>
+            <a:r>
+              <a:rPr lang="de-AT" sz="1400" dirty="0" smtClean="0"/>
+              <a:t>}</a:t>
+            </a:r>
+          </a:p>
+          <a:p>
+            <a:pPr marL="0" indent="0">
+              <a:buNone/>
+            </a:pPr>
+            <a:r>
+              <a:rPr lang="de-AT" sz="1400" dirty="0" err="1"/>
+              <a:t>public</a:t>
+            </a:r>
+            <a:r>
+              <a:rPr lang="de-AT" sz="1400" dirty="0"/>
+              <a:t> </a:t>
+            </a:r>
+            <a:r>
+              <a:rPr lang="de-AT" sz="1400" dirty="0" err="1"/>
+              <a:t>interface</a:t>
+            </a:r>
+            <a:r>
+              <a:rPr lang="de-AT" sz="1400" dirty="0"/>
+              <a:t> </a:t>
+            </a:r>
+            <a:r>
+              <a:rPr lang="de-AT" sz="1400" dirty="0" err="1"/>
+              <a:t>SelectedSportsValue</a:t>
+            </a:r>
+            <a:r>
+              <a:rPr lang="de-AT" sz="1400" dirty="0"/>
+              <a:t> </a:t>
+            </a:r>
+            <a:r>
+              <a:rPr lang="de-AT" sz="1400" dirty="0" smtClean="0"/>
+              <a:t>{</a:t>
+            </a:r>
+            <a:endParaRPr lang="de-AT" sz="1400" dirty="0"/>
+          </a:p>
+          <a:p>
+            <a:pPr marL="0" indent="0">
+              <a:buNone/>
+            </a:pPr>
+            <a:r>
+              <a:rPr lang="de-AT" sz="1400" dirty="0"/>
+              <a:t>    </a:t>
+            </a:r>
+            <a:r>
+              <a:rPr lang="de-AT" sz="1400" dirty="0" err="1"/>
+              <a:t>void</a:t>
+            </a:r>
+            <a:r>
+              <a:rPr lang="de-AT" sz="1400" dirty="0"/>
+              <a:t> </a:t>
+            </a:r>
+            <a:r>
+              <a:rPr lang="de-AT" sz="1400" dirty="0" err="1"/>
+              <a:t>sportSelected</a:t>
+            </a:r>
+            <a:r>
+              <a:rPr lang="de-AT" sz="1400" dirty="0"/>
+              <a:t>(List&lt;</a:t>
+            </a:r>
+            <a:r>
+              <a:rPr lang="de-AT" sz="1400" dirty="0" err="1"/>
+              <a:t>ITypeOfSportDto</a:t>
+            </a:r>
+            <a:r>
+              <a:rPr lang="de-AT" sz="1400" dirty="0"/>
+              <a:t>&gt; </a:t>
+            </a:r>
+            <a:r>
+              <a:rPr lang="de-AT" sz="1400" dirty="0" err="1"/>
+              <a:t>sport</a:t>
+            </a:r>
+            <a:r>
+              <a:rPr lang="de-AT" sz="1400" dirty="0"/>
+              <a:t>);</a:t>
+            </a:r>
+          </a:p>
+          <a:p>
+            <a:pPr marL="0" indent="0">
+              <a:buNone/>
+            </a:pPr>
+            <a:r>
+              <a:rPr lang="de-AT" sz="1400" dirty="0"/>
+              <a:t>    List&lt;</a:t>
+            </a:r>
+            <a:r>
+              <a:rPr lang="de-AT" sz="1400" dirty="0" err="1"/>
+              <a:t>IClubTeamDto</a:t>
+            </a:r>
+            <a:r>
+              <a:rPr lang="de-AT" sz="1400" dirty="0"/>
+              <a:t>&gt; </a:t>
+            </a:r>
+            <a:r>
+              <a:rPr lang="de-AT" sz="1400" dirty="0" err="1"/>
+              <a:t>getClubTeamsBySport</a:t>
+            </a:r>
+            <a:r>
+              <a:rPr lang="de-AT" sz="1400" dirty="0"/>
+              <a:t>(</a:t>
+            </a:r>
+            <a:r>
+              <a:rPr lang="de-AT" sz="1400" dirty="0" err="1"/>
+              <a:t>ITypeOfSportDto</a:t>
+            </a:r>
+            <a:r>
+              <a:rPr lang="de-AT" sz="1400" dirty="0"/>
+              <a:t> </a:t>
+            </a:r>
+            <a:r>
+              <a:rPr lang="de-AT" sz="1400" dirty="0" err="1"/>
+              <a:t>sport</a:t>
+            </a:r>
+            <a:r>
+              <a:rPr lang="de-AT" sz="1400" dirty="0"/>
+              <a:t>);</a:t>
+            </a:r>
+          </a:p>
+          <a:p>
+            <a:pPr marL="0" indent="0">
+              <a:buNone/>
+            </a:pPr>
+            <a:r>
+              <a:rPr lang="de-AT" sz="1400" dirty="0"/>
+              <a:t>}</a:t>
+            </a:r>
+          </a:p>
+          <a:p>
+            <a:pPr marL="0" indent="0">
+              <a:buNone/>
+            </a:pPr>
+            <a:endParaRPr lang="de-AT" sz="1300" dirty="0" smtClean="0"/>
+          </a:p>
+        </p:txBody>
+      </p:sp>
+      <p:sp>
+        <p:nvSpPr>
+          <p:cNvPr id="4" name="Inhaltsplatzhalter 3"/>
+          <p:cNvSpPr>
+            <a:spLocks noGrp="1"/>
+          </p:cNvSpPr>
+          <p:nvPr>
+            <p:ph sz="half" idx="4294967295"/>
+          </p:nvPr>
+        </p:nvSpPr>
+        <p:spPr>
+          <a:xfrm>
+            <a:off x="7364413" y="2309813"/>
+            <a:ext cx="4827587" cy="4022725"/>
+          </a:xfrm>
+        </p:spPr>
         <p:txBody>
           <a:bodyPr>
             <a:normAutofit/>
           </a:bodyPr>
           <a:lstStyle/>
           <a:p>
-            <a:pPr>
-              <a:buFont typeface="Arial" panose="020B0604020202020204" pitchFamily="34" charset="0"/>
-              <a:buChar char="•"/>
-            </a:pPr>
-            <a:r>
-              <a:rPr lang="de-AT" dirty="0" smtClean="0"/>
-              <a:t>Login</a:t>
-            </a:r>
-          </a:p>
-          <a:p>
-            <a:pPr>
-              <a:buFont typeface="Arial" panose="020B0604020202020204" pitchFamily="34" charset="0"/>
-              <a:buChar char="•"/>
-            </a:pPr>
-            <a:r>
-              <a:rPr lang="de-AT" dirty="0" err="1" smtClean="0"/>
-              <a:t>Corba</a:t>
-            </a:r>
+            <a:pPr marL="0" indent="0">
+              <a:buNone/>
+            </a:pPr>
             <a:endParaRPr lang="de-AT" dirty="0" smtClean="0"/>
           </a:p>
           <a:p>
-            <a:pPr>
-              <a:buFont typeface="Arial" panose="020B0604020202020204" pitchFamily="34" charset="0"/>
-              <a:buChar char="•"/>
-            </a:pPr>
-            <a:r>
-              <a:rPr lang="de-AT" dirty="0" smtClean="0"/>
-              <a:t>Einladungen</a:t>
-            </a:r>
-          </a:p>
-          <a:p>
-            <a:pPr>
-              <a:buFont typeface="Arial" panose="020B0604020202020204" pitchFamily="34" charset="0"/>
-              <a:buChar char="•"/>
-            </a:pPr>
-            <a:r>
-              <a:rPr lang="de-AT" dirty="0" smtClean="0"/>
-              <a:t>Webservice</a:t>
-            </a:r>
-          </a:p>
-          <a:p>
-            <a:pPr>
-              <a:buFont typeface="Arial" panose="020B0604020202020204" pitchFamily="34" charset="0"/>
-              <a:buChar char="•"/>
-            </a:pPr>
-            <a:r>
-              <a:rPr lang="de-AT" dirty="0" smtClean="0"/>
-              <a:t>JMS</a:t>
-            </a:r>
-          </a:p>
-        </p:txBody>
-      </p:sp>
+            <a:pPr marL="0" indent="0">
+              <a:buNone/>
+            </a:pPr>
+            <a:endParaRPr lang="de-AT" dirty="0"/>
+          </a:p>
+          <a:p>
+            <a:pPr marL="0" indent="0">
+              <a:buNone/>
+            </a:pPr>
+            <a:endParaRPr lang="de-AT" dirty="0" smtClean="0"/>
+          </a:p>
+          <a:p>
+            <a:pPr marL="0" indent="0">
+              <a:buNone/>
+            </a:pPr>
+            <a:endParaRPr lang="de-AT" dirty="0"/>
+          </a:p>
+          <a:p>
+            <a:pPr marL="0" indent="0">
+              <a:buNone/>
+            </a:pPr>
+            <a:endParaRPr lang="de-AT" dirty="0" smtClean="0"/>
+          </a:p>
+          <a:p>
+            <a:pPr marL="0" indent="0">
+              <a:buNone/>
+            </a:pPr>
+            <a:endParaRPr lang="de-AT" dirty="0"/>
+          </a:p>
+          <a:p>
+            <a:pPr marL="0" indent="0">
+              <a:buNone/>
+            </a:pPr>
+            <a:endParaRPr lang="de-AT" dirty="0" smtClean="0"/>
+          </a:p>
+          <a:p>
+            <a:pPr marL="0" indent="0">
+              <a:buNone/>
+            </a:pPr>
+            <a:endParaRPr lang="de-AT" sz="2400" dirty="0" smtClean="0"/>
+          </a:p>
+          <a:p>
+            <a:endParaRPr lang="de-AT" dirty="0"/>
+          </a:p>
+        </p:txBody>
+      </p:sp>
+      <p:pic>
+        <p:nvPicPr>
+          <p:cNvPr id="3075" name="Picture 3"/>
+          <p:cNvPicPr>
+            <a:picLocks noChangeAspect="1" noChangeArrowheads="1"/>
+          </p:cNvPicPr>
+          <p:nvPr/>
+        </p:nvPicPr>
+        <p:blipFill>
+          <a:blip r:embed="rId2">
+            <a:extLst>
+              <a:ext uri="{28A0092B-C50C-407E-A947-70E740481C1C}">
+                <a14:useLocalDpi xmlns:a14="http://schemas.microsoft.com/office/drawing/2010/main" val="0"/>
+              </a:ext>
+            </a:extLst>
+          </a:blip>
+          <a:srcRect/>
+          <a:stretch>
+            <a:fillRect/>
+          </a:stretch>
+        </p:blipFill>
+        <p:spPr bwMode="auto">
+          <a:xfrm>
+            <a:off x="8562614" y="3188826"/>
+            <a:ext cx="3143250" cy="3200400"/>
+          </a:xfrm>
+          <a:prstGeom prst="rect">
+            <a:avLst/>
+          </a:prstGeom>
+          <a:noFill/>
+          <a:ln>
+            <a:noFill/>
+          </a:ln>
+          <a:effectLst/>
+          <a:extLst>
+            <a:ext uri="{909E8E84-426E-40DD-AFC4-6F175D3DCCD1}">
+              <a14:hiddenFill xmlns:a14="http://schemas.microsoft.com/office/drawing/2010/main">
+                <a:solidFill>
+                  <a:schemeClr val="accent1"/>
+                </a:solidFill>
+              </a14:hiddenFill>
+            </a:ext>
+            <a:ext uri="{91240B29-F687-4F45-9708-019B960494DF}">
+              <a14:hiddenLine xmlns:a14="http://schemas.microsoft.com/office/drawing/2010/main" w="9525">
+                <a:solidFill>
+                  <a:schemeClr val="tx1"/>
+                </a:solidFill>
+                <a:miter lim="800000"/>
+                <a:headEnd/>
+                <a:tailEnd/>
+              </a14:hiddenLine>
+            </a:ext>
+            <a:ext uri="{AF507438-7753-43E0-B8FC-AC1667EBCBE1}">
+              <a14:hiddenEffects xmlns:a14="http://schemas.microsoft.com/office/drawing/2010/main">
+                <a:effectLst>
+                  <a:outerShdw dist="35921" dir="2700000" algn="ctr" rotWithShape="0">
+                    <a:schemeClr val="bg2"/>
+                  </a:outerShdw>
+                </a:effectLst>
+              </a14:hiddenEffects>
+            </a:ext>
+          </a:extLst>
+        </p:spPr>
+      </p:pic>
     </p:spTree>
     <p:extLst>
       <p:ext uri="{BB962C8B-B14F-4D97-AF65-F5344CB8AC3E}">
-        <p14:creationId xmlns:p14="http://schemas.microsoft.com/office/powerpoint/2010/main" val="3732497756"/>
+        <p14:creationId xmlns:p14="http://schemas.microsoft.com/office/powerpoint/2010/main" val="332312375"/>
       </p:ext>
     </p:extLst>
   </p:cSld>
   <p:clrMapOvr>
     <a:masterClrMapping/>
   </p:clrMapOvr>
+  <p:timing>
+    <p:tnLst>
+      <p:par>
+        <p:cTn id="1" dur="indefinite" restart="never" nodeType="tmRoot"/>
+      </p:par>
+    </p:tnLst>
+  </p:timing>
 </p:sld>
 </file>
 
@@ -12504,7 +13095,7 @@
       </p:grpSpPr>
       <p:sp>
         <p:nvSpPr>
-          <p:cNvPr id="2" name="Titel 1"/>
+          <p:cNvPr id="4" name="Titel 3"/>
           <p:cNvSpPr>
             <a:spLocks noGrp="1"/>
           </p:cNvSpPr>
@@ -12519,104 +13110,59 @@
           <a:p>
             <a:r>
               <a:rPr lang="de-AT" dirty="0" smtClean="0"/>
-              <a:t>Tests &amp; Probleme</a:t>
+              <a:t>Wettkampf anlegen</a:t>
             </a:r>
             <a:endParaRPr lang="de-AT" dirty="0"/>
           </a:p>
         </p:txBody>
       </p:sp>
-      <p:sp>
-        <p:nvSpPr>
-          <p:cNvPr id="3" name="Inhaltsplatzhalter 2"/>
-          <p:cNvSpPr>
-            <a:spLocks noGrp="1"/>
-          </p:cNvSpPr>
+      <p:pic>
+        <p:nvPicPr>
+          <p:cNvPr id="4101" name="Picture 5" descr="C:\Users\luc\Desktop\CreateCompetition.png"/>
+          <p:cNvPicPr>
+            <a:picLocks noGrp="1" noChangeAspect="1" noChangeArrowheads="1"/>
+          </p:cNvPicPr>
           <p:nvPr>
             <p:ph idx="1"/>
           </p:nvPr>
-        </p:nvSpPr>
-        <p:spPr/>
-        <p:txBody>
-          <a:bodyPr/>
-          <a:lstStyle/>
-          <a:p>
-            <a:pPr>
-              <a:buFont typeface="Arial" panose="020B0604020202020204" pitchFamily="34" charset="0"/>
-              <a:buChar char="•"/>
-            </a:pPr>
-            <a:r>
-              <a:rPr lang="de-AT" dirty="0" err="1"/>
-              <a:t>Exception</a:t>
-            </a:r>
-            <a:r>
-              <a:rPr lang="de-AT" dirty="0"/>
-              <a:t> </a:t>
-            </a:r>
-            <a:r>
-              <a:rPr lang="de-AT" dirty="0" err="1"/>
-              <a:t>Handeling</a:t>
-            </a:r>
-            <a:r>
-              <a:rPr lang="de-AT" dirty="0"/>
-              <a:t> verbessert</a:t>
-            </a:r>
-          </a:p>
-          <a:p>
-            <a:pPr>
-              <a:buFont typeface="Arial" panose="020B0604020202020204" pitchFamily="34" charset="0"/>
-              <a:buChar char="•"/>
-            </a:pPr>
-            <a:r>
-              <a:rPr lang="de-AT" dirty="0"/>
-              <a:t>Aufwändig</a:t>
-            </a:r>
-          </a:p>
-          <a:p>
-            <a:pPr lvl="1">
-              <a:buFont typeface="Arial" panose="020B0604020202020204" pitchFamily="34" charset="0"/>
-              <a:buChar char="•"/>
-            </a:pPr>
-            <a:r>
-              <a:rPr lang="de-AT" dirty="0"/>
-              <a:t>Fehler -&gt; mehrere Schichten</a:t>
-            </a:r>
-          </a:p>
-          <a:p>
-            <a:pPr>
-              <a:buFont typeface="Arial" panose="020B0604020202020204" pitchFamily="34" charset="0"/>
-              <a:buChar char="•"/>
-            </a:pPr>
-            <a:r>
-              <a:rPr lang="de-AT" dirty="0"/>
-              <a:t>Wiederverwendbare Forms</a:t>
-            </a:r>
-          </a:p>
-          <a:p>
-            <a:pPr>
-              <a:buFont typeface="Arial" panose="020B0604020202020204" pitchFamily="34" charset="0"/>
-              <a:buChar char="•"/>
-            </a:pPr>
-            <a:r>
-              <a:rPr lang="de-AT" dirty="0"/>
-              <a:t>Unit Tests</a:t>
-            </a:r>
-          </a:p>
-          <a:p>
-            <a:pPr>
-              <a:buFont typeface="Arial" panose="020B0604020202020204" pitchFamily="34" charset="0"/>
-              <a:buChar char="•"/>
-            </a:pPr>
-            <a:r>
-              <a:rPr lang="de-AT" dirty="0"/>
-              <a:t>Datenbank Testapplikation</a:t>
-            </a:r>
-          </a:p>
-        </p:txBody>
-      </p:sp>
+        </p:nvPicPr>
+        <p:blipFill>
+          <a:blip r:embed="rId2">
+            <a:extLst>
+              <a:ext uri="{28A0092B-C50C-407E-A947-70E740481C1C}">
+                <a14:useLocalDpi xmlns:a14="http://schemas.microsoft.com/office/drawing/2010/main" val="0"/>
+              </a:ext>
+            </a:extLst>
+          </a:blip>
+          <a:srcRect/>
+          <a:stretch>
+            <a:fillRect/>
+          </a:stretch>
+        </p:blipFill>
+        <p:spPr bwMode="auto">
+          <a:xfrm>
+            <a:off x="2677883" y="2286000"/>
+            <a:ext cx="6226633" cy="4022725"/>
+          </a:xfrm>
+          <a:prstGeom prst="rect">
+            <a:avLst/>
+          </a:prstGeom>
+          <a:noFill/>
+          <a:extLst>
+            <a:ext uri="{909E8E84-426E-40DD-AFC4-6F175D3DCCD1}">
+              <a14:hiddenFill xmlns:a14="http://schemas.microsoft.com/office/drawing/2010/main">
+                <a:solidFill>
+                  <a:srgbClr val="FFFFFF"/>
+                </a:solidFill>
+              </a14:hiddenFill>
+            </a:ext>
+          </a:extLst>
+        </p:spPr>
+      </p:pic>
     </p:spTree>
     <p:extLst>
       <p:ext uri="{BB962C8B-B14F-4D97-AF65-F5344CB8AC3E}">
-        <p14:creationId xmlns:p14="http://schemas.microsoft.com/office/powerpoint/2010/main" val="856229136"/>
+        <p14:creationId xmlns:p14="http://schemas.microsoft.com/office/powerpoint/2010/main" val="1123659033"/>
       </p:ext>
     </p:extLst>
   </p:cSld>
@@ -12645,7 +13191,7 @@
       </p:grpSpPr>
       <p:sp>
         <p:nvSpPr>
-          <p:cNvPr id="2" name="Title 1"/>
+          <p:cNvPr id="2" name="Titel 1"/>
           <p:cNvSpPr>
             <a:spLocks noGrp="1"/>
           </p:cNvSpPr>
@@ -12659,54 +13205,138 @@
           <a:lstStyle/>
           <a:p>
             <a:r>
+              <a:rPr lang="de-AT" dirty="0" smtClean="0"/>
+              <a:t>Erweiterungen</a:t>
+            </a:r>
+            <a:endParaRPr lang="de-AT" dirty="0"/>
+          </a:p>
+        </p:txBody>
+      </p:sp>
+      <p:sp>
+        <p:nvSpPr>
+          <p:cNvPr id="3" name="Inhaltsplatzhalter 2"/>
+          <p:cNvSpPr>
+            <a:spLocks noGrp="1"/>
+          </p:cNvSpPr>
+          <p:nvPr>
+            <p:ph idx="1"/>
+          </p:nvPr>
+        </p:nvSpPr>
+        <p:spPr/>
+        <p:txBody>
+          <a:bodyPr>
+            <a:normAutofit/>
+          </a:bodyPr>
+          <a:lstStyle/>
+          <a:p>
+            <a:pPr>
+              <a:buFont typeface="Arial" panose="020B0604020202020204" pitchFamily="34" charset="0"/>
+              <a:buChar char="•"/>
+            </a:pPr>
+            <a:r>
+              <a:rPr lang="de-AT" dirty="0" smtClean="0"/>
+              <a:t>Wöchentliche Anpassungen:</a:t>
+            </a:r>
+          </a:p>
+          <a:p>
+            <a:pPr lvl="1">
+              <a:buFont typeface="Arial" panose="020B0604020202020204" pitchFamily="34" charset="0"/>
+              <a:buChar char="•"/>
+            </a:pPr>
+            <a:r>
+              <a:rPr lang="de-AT" dirty="0"/>
+              <a:t>Mitglied zu Team hinzufügen</a:t>
+            </a:r>
+          </a:p>
+          <a:p>
+            <a:pPr lvl="1">
+              <a:buFont typeface="Arial" panose="020B0604020202020204" pitchFamily="34" charset="0"/>
+              <a:buChar char="•"/>
+            </a:pPr>
+            <a:r>
+              <a:rPr lang="de-AT" dirty="0" smtClean="0"/>
+              <a:t>Login mit LDAP, Zugriffserlaubnis?</a:t>
+            </a:r>
+          </a:p>
+          <a:p>
+            <a:pPr lvl="1">
+              <a:buFont typeface="Arial" panose="020B0604020202020204" pitchFamily="34" charset="0"/>
+              <a:buChar char="•"/>
+            </a:pPr>
+            <a:r>
+              <a:rPr lang="de-AT" dirty="0" smtClean="0"/>
+              <a:t>EJB</a:t>
+            </a:r>
+          </a:p>
+          <a:p>
+            <a:pPr lvl="1">
+              <a:buFont typeface="Arial" panose="020B0604020202020204" pitchFamily="34" charset="0"/>
+              <a:buChar char="•"/>
+            </a:pPr>
+            <a:endParaRPr lang="de-AT" dirty="0" smtClean="0"/>
+          </a:p>
+          <a:p>
+            <a:pPr lvl="1">
+              <a:buFont typeface="Arial" panose="020B0604020202020204" pitchFamily="34" charset="0"/>
+              <a:buChar char="•"/>
+            </a:pPr>
+            <a:r>
+              <a:rPr lang="de-AT" dirty="0" smtClean="0"/>
+              <a:t>Wettkampfergebnisse (</a:t>
+            </a:r>
+            <a:r>
               <a:rPr lang="de-AT" dirty="0" err="1" smtClean="0"/>
-              <a:t>Lessons</a:t>
+              <a:t>Corba</a:t>
             </a:r>
             <a:r>
               <a:rPr lang="de-AT" dirty="0" smtClean="0"/>
-              <a:t> </a:t>
-            </a:r>
+              <a:t>)</a:t>
+            </a:r>
+          </a:p>
+          <a:p>
+            <a:pPr lvl="1">
+              <a:buFont typeface="Arial" panose="020B0604020202020204" pitchFamily="34" charset="0"/>
+              <a:buChar char="•"/>
+            </a:pPr>
+            <a:r>
+              <a:rPr lang="de-AT" dirty="0"/>
+              <a:t>Einladungen </a:t>
+            </a:r>
+            <a:r>
+              <a:rPr lang="de-AT" dirty="0" smtClean="0"/>
+              <a:t>JMS</a:t>
+            </a:r>
+          </a:p>
+          <a:p>
+            <a:pPr lvl="1">
+              <a:buFont typeface="Arial" panose="020B0604020202020204" pitchFamily="34" charset="0"/>
+              <a:buChar char="•"/>
+            </a:pPr>
             <a:r>
               <a:rPr lang="de-AT" dirty="0" err="1" smtClean="0"/>
-              <a:t>Learned</a:t>
-            </a:r>
-            <a:endParaRPr lang="de-AT" dirty="0"/>
-          </a:p>
-        </p:txBody>
-      </p:sp>
-      <p:sp>
-        <p:nvSpPr>
-          <p:cNvPr id="3" name="Text Placeholder 2"/>
-          <p:cNvSpPr>
-            <a:spLocks noGrp="1"/>
-          </p:cNvSpPr>
-          <p:nvPr>
-            <p:ph type="body" idx="1"/>
-          </p:nvPr>
-        </p:nvSpPr>
-        <p:spPr/>
-        <p:txBody>
-          <a:bodyPr/>
-          <a:lstStyle/>
-          <a:p>
-            <a:r>
-              <a:rPr lang="de-AT" dirty="0" smtClean="0"/>
-              <a:t>Das Ende</a:t>
-            </a:r>
-            <a:endParaRPr lang="de-AT" dirty="0"/>
+              <a:t>WebClient</a:t>
+            </a:r>
+            <a:endParaRPr lang="de-AT" dirty="0" smtClean="0"/>
           </a:p>
         </p:txBody>
       </p:sp>
     </p:spTree>
     <p:extLst>
       <p:ext uri="{BB962C8B-B14F-4D97-AF65-F5344CB8AC3E}">
-        <p14:creationId xmlns:p14="http://schemas.microsoft.com/office/powerpoint/2010/main" val="476809469"/>
+        <p14:creationId xmlns:p14="http://schemas.microsoft.com/office/powerpoint/2010/main" val="3732497756"/>
       </p:ext>
     </p:extLst>
   </p:cSld>
   <p:clrMapOvr>
     <a:masterClrMapping/>
   </p:clrMapOvr>
+  <p:timing>
+    <p:tnLst>
+      <p:par>
+        <p:cTn id="1" dur="indefinite" restart="never" nodeType="tmRoot"/>
+      </p:par>
+    </p:tnLst>
+  </p:timing>
 </p:sld>
 </file>
 
@@ -12743,16 +13373,8 @@
           <a:lstStyle/>
           <a:p>
             <a:r>
-              <a:rPr lang="de-AT" dirty="0" err="1" smtClean="0"/>
-              <a:t>Lessons</a:t>
-            </a:r>
-            <a:r>
               <a:rPr lang="de-AT" dirty="0" smtClean="0"/>
-              <a:t> </a:t>
-            </a:r>
-            <a:r>
-              <a:rPr lang="de-AT" dirty="0" err="1" smtClean="0"/>
-              <a:t>Learned</a:t>
+              <a:t>Tests &amp; Probleme</a:t>
             </a:r>
             <a:endParaRPr lang="de-AT" dirty="0"/>
           </a:p>
@@ -12778,8 +13400,8 @@
               <a:buChar char="•"/>
             </a:pPr>
             <a:r>
-              <a:rPr lang="de-AT" dirty="0"/>
-              <a:t>Technologien schließen sich gegenseitig aus</a:t>
+              <a:rPr lang="de-AT" dirty="0" smtClean="0"/>
+              <a:t>Kompatibilität</a:t>
             </a:r>
           </a:p>
           <a:p>
@@ -12788,8 +13410,20 @@
               <a:buChar char="•"/>
             </a:pPr>
             <a:r>
+              <a:rPr lang="de-AT" dirty="0" err="1" smtClean="0"/>
+              <a:t>Exception</a:t>
+            </a:r>
+            <a:r>
+              <a:rPr lang="de-AT" dirty="0" smtClean="0"/>
+              <a:t> </a:t>
+            </a:r>
+            <a:r>
+              <a:rPr lang="de-AT" dirty="0" err="1"/>
+              <a:t>Handeling</a:t>
+            </a:r>
+            <a:r>
               <a:rPr lang="de-AT" dirty="0"/>
-              <a:t>Genaue Analyse der Aufgabenstellung und abstecken was noch kommen kann</a:t>
+              <a:t> verbessert</a:t>
             </a:r>
           </a:p>
           <a:p>
@@ -12799,7 +13433,17 @@
             </a:pPr>
             <a:r>
               <a:rPr lang="de-AT" dirty="0"/>
-              <a:t>Zeitmanagement essentiell</a:t>
+              <a:t>Aufwändig</a:t>
+            </a:r>
+          </a:p>
+          <a:p>
+            <a:pPr lvl="1">
+              <a:buFont typeface="Arial" panose="020B0604020202020204" pitchFamily="34" charset="0"/>
+              <a:buChar char="•"/>
+            </a:pPr>
+            <a:r>
+              <a:rPr lang="de-AT" dirty="0"/>
+              <a:t>Fehler -&gt; mehrere Schichten</a:t>
             </a:r>
           </a:p>
           <a:p>
@@ -12808,12 +13452,28 @@
               <a:buChar char="•"/>
             </a:pPr>
             <a:r>
-              <a:rPr lang="de-AT" dirty="0" err="1"/>
-              <a:t>Hibernate</a:t>
-            </a:r>
-            <a:r>
               <a:rPr lang="de-AT" dirty="0"/>
-              <a:t> -&gt; Technologie Anpassungen</a:t>
+              <a:t>Wiederverwendbare Forms</a:t>
+            </a:r>
+          </a:p>
+          <a:p>
+            <a:pPr>
+              <a:buFont typeface="Arial" panose="020B0604020202020204" pitchFamily="34" charset="0"/>
+              <a:buChar char="•"/>
+            </a:pPr>
+            <a:r>
+              <a:rPr lang="de-AT" dirty="0"/>
+              <a:t>Unit Tests</a:t>
+            </a:r>
+          </a:p>
+          <a:p>
+            <a:pPr>
+              <a:buFont typeface="Arial" panose="020B0604020202020204" pitchFamily="34" charset="0"/>
+              <a:buChar char="•"/>
+            </a:pPr>
+            <a:r>
+              <a:rPr lang="de-AT" dirty="0"/>
+              <a:t>Datenbank Testapplikation</a:t>
             </a:r>
           </a:p>
         </p:txBody>
@@ -12821,13 +13481,20 @@
     </p:spTree>
     <p:extLst>
       <p:ext uri="{BB962C8B-B14F-4D97-AF65-F5344CB8AC3E}">
-        <p14:creationId xmlns:p14="http://schemas.microsoft.com/office/powerpoint/2010/main" val="3386145516"/>
+        <p14:creationId xmlns:p14="http://schemas.microsoft.com/office/powerpoint/2010/main" val="856229136"/>
       </p:ext>
     </p:extLst>
   </p:cSld>
   <p:clrMapOvr>
     <a:masterClrMapping/>
   </p:clrMapOvr>
+  <p:timing>
+    <p:tnLst>
+      <p:par>
+        <p:cTn id="1" dur="indefinite" restart="never" nodeType="tmRoot"/>
+      </p:par>
+    </p:tnLst>
+  </p:timing>
 </p:sld>
 </file>
 
@@ -12850,6 +13517,233 @@
       </p:grpSpPr>
       <p:sp>
         <p:nvSpPr>
+          <p:cNvPr id="2" name="Title 1"/>
+          <p:cNvSpPr>
+            <a:spLocks noGrp="1"/>
+          </p:cNvSpPr>
+          <p:nvPr>
+            <p:ph type="title"/>
+          </p:nvPr>
+        </p:nvSpPr>
+        <p:spPr/>
+        <p:txBody>
+          <a:bodyPr/>
+          <a:lstStyle/>
+          <a:p>
+            <a:r>
+              <a:rPr lang="de-AT" dirty="0" err="1" smtClean="0"/>
+              <a:t>Lessons</a:t>
+            </a:r>
+            <a:r>
+              <a:rPr lang="de-AT" dirty="0" smtClean="0"/>
+              <a:t> </a:t>
+            </a:r>
+            <a:r>
+              <a:rPr lang="de-AT" dirty="0" err="1" smtClean="0"/>
+              <a:t>Learned</a:t>
+            </a:r>
+            <a:endParaRPr lang="de-AT" dirty="0"/>
+          </a:p>
+        </p:txBody>
+      </p:sp>
+      <p:sp>
+        <p:nvSpPr>
+          <p:cNvPr id="3" name="Text Placeholder 2"/>
+          <p:cNvSpPr>
+            <a:spLocks noGrp="1"/>
+          </p:cNvSpPr>
+          <p:nvPr>
+            <p:ph type="body" idx="1"/>
+          </p:nvPr>
+        </p:nvSpPr>
+        <p:spPr/>
+        <p:txBody>
+          <a:bodyPr/>
+          <a:lstStyle/>
+          <a:p>
+            <a:r>
+              <a:rPr lang="de-AT" dirty="0" smtClean="0"/>
+              <a:t>Das Ende</a:t>
+            </a:r>
+            <a:endParaRPr lang="de-AT" dirty="0"/>
+          </a:p>
+        </p:txBody>
+      </p:sp>
+    </p:spTree>
+    <p:extLst>
+      <p:ext uri="{BB962C8B-B14F-4D97-AF65-F5344CB8AC3E}">
+        <p14:creationId xmlns:p14="http://schemas.microsoft.com/office/powerpoint/2010/main" val="476809469"/>
+      </p:ext>
+    </p:extLst>
+  </p:cSld>
+  <p:clrMapOvr>
+    <a:masterClrMapping/>
+  </p:clrMapOvr>
+</p:sld>
+</file>
+
+<file path=ppt/slides/slide46.xml><?xml version="1.0" encoding="utf-8"?>
+<p:sld xmlns:a="http://schemas.openxmlformats.org/drawingml/2006/main" xmlns:r="http://schemas.openxmlformats.org/officeDocument/2006/relationships" xmlns:p="http://schemas.openxmlformats.org/presentationml/2006/main">
+  <p:cSld>
+    <p:spTree>
+      <p:nvGrpSpPr>
+        <p:cNvPr id="1" name=""/>
+        <p:cNvGrpSpPr/>
+        <p:nvPr/>
+      </p:nvGrpSpPr>
+      <p:grpSpPr>
+        <a:xfrm>
+          <a:off x="0" y="0"/>
+          <a:ext cx="0" cy="0"/>
+          <a:chOff x="0" y="0"/>
+          <a:chExt cx="0" cy="0"/>
+        </a:xfrm>
+      </p:grpSpPr>
+      <p:sp>
+        <p:nvSpPr>
+          <p:cNvPr id="2" name="Titel 1"/>
+          <p:cNvSpPr>
+            <a:spLocks noGrp="1"/>
+          </p:cNvSpPr>
+          <p:nvPr>
+            <p:ph type="title"/>
+          </p:nvPr>
+        </p:nvSpPr>
+        <p:spPr/>
+        <p:txBody>
+          <a:bodyPr/>
+          <a:lstStyle/>
+          <a:p>
+            <a:r>
+              <a:rPr lang="de-AT" dirty="0" err="1" smtClean="0"/>
+              <a:t>Lessons</a:t>
+            </a:r>
+            <a:r>
+              <a:rPr lang="de-AT" dirty="0" smtClean="0"/>
+              <a:t> </a:t>
+            </a:r>
+            <a:r>
+              <a:rPr lang="de-AT" dirty="0" err="1" smtClean="0"/>
+              <a:t>Learned</a:t>
+            </a:r>
+            <a:endParaRPr lang="de-AT" dirty="0"/>
+          </a:p>
+        </p:txBody>
+      </p:sp>
+      <p:sp>
+        <p:nvSpPr>
+          <p:cNvPr id="3" name="Inhaltsplatzhalter 2"/>
+          <p:cNvSpPr>
+            <a:spLocks noGrp="1"/>
+          </p:cNvSpPr>
+          <p:nvPr>
+            <p:ph idx="1"/>
+          </p:nvPr>
+        </p:nvSpPr>
+        <p:spPr/>
+        <p:txBody>
+          <a:bodyPr/>
+          <a:lstStyle/>
+          <a:p>
+            <a:pPr>
+              <a:buFont typeface="Arial" panose="020B0604020202020204" pitchFamily="34" charset="0"/>
+              <a:buChar char="•"/>
+            </a:pPr>
+            <a:r>
+              <a:rPr lang="de-AT" dirty="0" smtClean="0"/>
+              <a:t>Analyse und genaue Aufteilung </a:t>
+            </a:r>
+            <a:r>
+              <a:rPr lang="de-AT" dirty="0"/>
+              <a:t>der </a:t>
+            </a:r>
+            <a:r>
+              <a:rPr lang="de-AT" dirty="0" smtClean="0"/>
+              <a:t>Aufgabenstellung</a:t>
+            </a:r>
+          </a:p>
+          <a:p>
+            <a:pPr>
+              <a:buFont typeface="Arial" panose="020B0604020202020204" pitchFamily="34" charset="0"/>
+              <a:buChar char="•"/>
+            </a:pPr>
+            <a:r>
+              <a:rPr lang="de-AT" dirty="0" smtClean="0"/>
+              <a:t>Konflikte </a:t>
+            </a:r>
+            <a:r>
+              <a:rPr lang="de-AT" smtClean="0"/>
+              <a:t>durch </a:t>
+            </a:r>
+            <a:r>
+              <a:rPr lang="de-AT" smtClean="0"/>
+              <a:t>verschiedene Technologien</a:t>
+            </a:r>
+            <a:endParaRPr lang="de-AT" dirty="0"/>
+          </a:p>
+          <a:p>
+            <a:pPr>
+              <a:buFont typeface="Arial" panose="020B0604020202020204" pitchFamily="34" charset="0"/>
+              <a:buChar char="•"/>
+            </a:pPr>
+            <a:r>
+              <a:rPr lang="de-AT" dirty="0" err="1" smtClean="0"/>
+              <a:t>Hibernate</a:t>
+            </a:r>
+            <a:r>
+              <a:rPr lang="de-AT" dirty="0" smtClean="0"/>
+              <a:t> vs. </a:t>
+            </a:r>
+            <a:r>
+              <a:rPr lang="de-AT" dirty="0"/>
+              <a:t>Technologie Anpassungen</a:t>
+            </a:r>
+          </a:p>
+          <a:p>
+            <a:pPr>
+              <a:buFont typeface="Arial" panose="020B0604020202020204" pitchFamily="34" charset="0"/>
+              <a:buChar char="•"/>
+            </a:pPr>
+            <a:r>
+              <a:rPr lang="de-AT" dirty="0" smtClean="0"/>
+              <a:t>Zeitmanagement essentiell</a:t>
+            </a:r>
+            <a:endParaRPr lang="de-AT" dirty="0"/>
+          </a:p>
+        </p:txBody>
+      </p:sp>
+    </p:spTree>
+    <p:extLst>
+      <p:ext uri="{BB962C8B-B14F-4D97-AF65-F5344CB8AC3E}">
+        <p14:creationId xmlns:p14="http://schemas.microsoft.com/office/powerpoint/2010/main" val="3386145516"/>
+      </p:ext>
+    </p:extLst>
+  </p:cSld>
+  <p:clrMapOvr>
+    <a:masterClrMapping/>
+  </p:clrMapOvr>
+</p:sld>
+</file>
+
+<file path=ppt/slides/slide47.xml><?xml version="1.0" encoding="utf-8"?>
+<p:sld xmlns:a="http://schemas.openxmlformats.org/drawingml/2006/main" xmlns:r="http://schemas.openxmlformats.org/officeDocument/2006/relationships" xmlns:p="http://schemas.openxmlformats.org/presentationml/2006/main">
+  <p:cSld>
+    <p:spTree>
+      <p:nvGrpSpPr>
+        <p:cNvPr id="1" name=""/>
+        <p:cNvGrpSpPr/>
+        <p:nvPr/>
+      </p:nvGrpSpPr>
+      <p:grpSpPr>
+        <a:xfrm>
+          <a:off x="0" y="0"/>
+          <a:ext cx="0" cy="0"/>
+          <a:chOff x="0" y="0"/>
+          <a:chExt cx="0" cy="0"/>
+        </a:xfrm>
+      </p:grpSpPr>
+      <p:sp>
+        <p:nvSpPr>
           <p:cNvPr id="2" name="Titel 1"/>
           <p:cNvSpPr>
             <a:spLocks noGrp="1"/>
@@ -12935,7 +13829,7 @@
 </p:sld>
 </file>
 
-<file path=ppt/slides/slide46.xml><?xml version="1.0" encoding="utf-8"?>
+<file path=ppt/slides/slide48.xml><?xml version="1.0" encoding="utf-8"?>
 <p:sld xmlns:a="http://schemas.openxmlformats.org/drawingml/2006/main" xmlns:r="http://schemas.openxmlformats.org/officeDocument/2006/relationships" xmlns:p="http://schemas.openxmlformats.org/presentationml/2006/main">
   <p:cSld>
     <p:spTree>

</xml_diff>